<commit_message>
modify the powerpoint file.
</commit_message>
<xml_diff>
--- a/Presentation_projet.pptx
+++ b/Presentation_projet.pptx
@@ -3378,7 +3378,7 @@
         </p:blipFill>
         <p:spPr>
           <a:xfrm>
-            <a:off x="701565" y="1539551"/>
+            <a:off x="692996" y="1483388"/>
             <a:ext cx="914400" cy="914400"/>
           </a:xfrm>
           <a:prstGeom prst="rect">
@@ -3417,7 +3417,7 @@
         </p:blipFill>
         <p:spPr>
           <a:xfrm>
-            <a:off x="838414" y="982823"/>
+            <a:off x="375103" y="1299886"/>
             <a:ext cx="640702" cy="640702"/>
           </a:xfrm>
           <a:prstGeom prst="rect">
@@ -3439,7 +3439,7 @@
         </p:nvSpPr>
         <p:spPr>
           <a:xfrm>
-            <a:off x="1720443" y="1875453"/>
+            <a:off x="1780672" y="1819290"/>
             <a:ext cx="611696" cy="242596"/>
           </a:xfrm>
           <a:prstGeom prst="rightArrow">
@@ -3448,15 +3448,15 @@
         </p:spPr>
         <p:style>
           <a:lnRef idx="2">
-            <a:schemeClr val="dk1">
+            <a:schemeClr val="accent5">
               <a:shade val="50000"/>
             </a:schemeClr>
           </a:lnRef>
           <a:fillRef idx="1">
-            <a:schemeClr val="dk1"/>
+            <a:schemeClr val="accent5"/>
           </a:fillRef>
           <a:effectRef idx="0">
-            <a:schemeClr val="dk1"/>
+            <a:schemeClr val="accent5"/>
           </a:effectRef>
           <a:fontRef idx="minor">
             <a:schemeClr val="lt1"/>
@@ -3502,7 +3502,7 @@
         </p:blipFill>
         <p:spPr>
           <a:xfrm>
-            <a:off x="2436617" y="1539551"/>
+            <a:off x="2557075" y="1483388"/>
             <a:ext cx="914400" cy="914400"/>
           </a:xfrm>
           <a:prstGeom prst="rect">
@@ -3537,7 +3537,7 @@
         </p:blipFill>
         <p:spPr>
           <a:xfrm>
-            <a:off x="4210057" y="1331415"/>
+            <a:off x="4412585" y="1275254"/>
             <a:ext cx="1695453" cy="1330669"/>
           </a:xfrm>
           <a:prstGeom prst="rect">
@@ -3572,7 +3572,7 @@
         </p:blipFill>
         <p:spPr>
           <a:xfrm>
-            <a:off x="9699103" y="1539551"/>
+            <a:off x="9699103" y="1493208"/>
             <a:ext cx="1872132" cy="894760"/>
           </a:xfrm>
           <a:prstGeom prst="rect">
@@ -3607,7 +3607,7 @@
         </p:blipFill>
         <p:spPr>
           <a:xfrm>
-            <a:off x="9842408" y="4019257"/>
+            <a:off x="9842340" y="3393016"/>
             <a:ext cx="1585519" cy="1546642"/>
           </a:xfrm>
           <a:prstGeom prst="rect">
@@ -3642,7 +3642,7 @@
         </p:blipFill>
         <p:spPr>
           <a:xfrm>
-            <a:off x="6956589" y="1381005"/>
+            <a:off x="7049148" y="1285112"/>
             <a:ext cx="1708848" cy="1310952"/>
           </a:xfrm>
           <a:prstGeom prst="rect">
@@ -3664,7 +3664,7 @@
         </p:nvSpPr>
         <p:spPr>
           <a:xfrm>
-            <a:off x="3455495" y="1875452"/>
+            <a:off x="3636182" y="1819290"/>
             <a:ext cx="611696" cy="242596"/>
           </a:xfrm>
           <a:prstGeom prst="rightArrow">
@@ -3673,15 +3673,15 @@
         </p:spPr>
         <p:style>
           <a:lnRef idx="2">
-            <a:schemeClr val="dk1">
+            <a:schemeClr val="accent5">
               <a:shade val="50000"/>
             </a:schemeClr>
           </a:lnRef>
           <a:fillRef idx="1">
-            <a:schemeClr val="dk1"/>
+            <a:schemeClr val="accent5"/>
           </a:fillRef>
           <a:effectRef idx="0">
-            <a:schemeClr val="dk1"/>
+            <a:schemeClr val="accent5"/>
           </a:effectRef>
           <a:fontRef idx="minor">
             <a:schemeClr val="lt1"/>
@@ -3698,10 +3698,10 @@
       </p:sp>
       <p:sp>
         <p:nvSpPr>
-          <p:cNvPr id="23" name="Flèche : droite 22">
-            <a:extLst>
-              <a:ext uri="{FF2B5EF4-FFF2-40B4-BE49-F238E27FC236}">
-                <a16:creationId xmlns:a16="http://schemas.microsoft.com/office/drawing/2014/main" id="{29730CEA-20BD-43F0-96E2-DEDB0351EF0F}"/>
+          <p:cNvPr id="24" name="Flèche : droite 23">
+            <a:extLst>
+              <a:ext uri="{FF2B5EF4-FFF2-40B4-BE49-F238E27FC236}">
+                <a16:creationId xmlns:a16="http://schemas.microsoft.com/office/drawing/2014/main" id="{83748380-3688-49B1-B9BC-E5740BE9E808}"/>
               </a:ext>
             </a:extLst>
           </p:cNvPr>
@@ -3710,7 +3710,7 @@
         </p:nvSpPr>
         <p:spPr>
           <a:xfrm>
-            <a:off x="6128163" y="1875452"/>
+            <a:off x="8929545" y="1819290"/>
             <a:ext cx="611696" cy="242596"/>
           </a:xfrm>
           <a:prstGeom prst="rightArrow">
@@ -3719,15 +3719,15 @@
         </p:spPr>
         <p:style>
           <a:lnRef idx="2">
-            <a:schemeClr val="dk1">
+            <a:schemeClr val="accent5">
               <a:shade val="50000"/>
             </a:schemeClr>
           </a:lnRef>
           <a:fillRef idx="1">
-            <a:schemeClr val="dk1"/>
+            <a:schemeClr val="accent5"/>
           </a:fillRef>
           <a:effectRef idx="0">
-            <a:schemeClr val="dk1"/>
+            <a:schemeClr val="accent5"/>
           </a:effectRef>
           <a:fontRef idx="minor">
             <a:schemeClr val="lt1"/>
@@ -3744,10 +3744,192 @@
       </p:sp>
       <p:sp>
         <p:nvSpPr>
-          <p:cNvPr id="24" name="Flèche : droite 23">
-            <a:extLst>
-              <a:ext uri="{FF2B5EF4-FFF2-40B4-BE49-F238E27FC236}">
-                <a16:creationId xmlns:a16="http://schemas.microsoft.com/office/drawing/2014/main" id="{83748380-3688-49B1-B9BC-E5740BE9E808}"/>
+          <p:cNvPr id="26" name="ZoneTexte 25">
+            <a:extLst>
+              <a:ext uri="{FF2B5EF4-FFF2-40B4-BE49-F238E27FC236}">
+                <a16:creationId xmlns:a16="http://schemas.microsoft.com/office/drawing/2014/main" id="{01822F30-8022-4606-8812-564D6B1F248C}"/>
+              </a:ext>
+            </a:extLst>
+          </p:cNvPr>
+          <p:cNvSpPr txBox="1"/>
+          <p:nvPr/>
+        </p:nvSpPr>
+        <p:spPr>
+          <a:xfrm>
+            <a:off x="7119783" y="998255"/>
+            <a:ext cx="1566628" cy="276999"/>
+          </a:xfrm>
+          <a:prstGeom prst="rect">
+            <a:avLst/>
+          </a:prstGeom>
+          <a:noFill/>
+        </p:spPr>
+        <p:txBody>
+          <a:bodyPr wrap="square" rtlCol="0">
+            <a:spAutoFit/>
+          </a:bodyPr>
+          <a:lstStyle/>
+          <a:p>
+            <a:pPr algn="ctr"/>
+            <a:r>
+              <a:rPr lang="fr-CA" sz="1200" b="1" dirty="0"/>
+              <a:t>Hough </a:t>
+            </a:r>
+            <a:r>
+              <a:rPr lang="fr-CA" sz="1200" b="1" dirty="0" err="1"/>
+              <a:t>Transform</a:t>
+            </a:r>
+            <a:r>
+              <a:rPr lang="fr-CA" sz="1200" b="1" dirty="0"/>
+              <a:t> [1]</a:t>
+            </a:r>
+            <a:endParaRPr lang="en-CA" sz="1200" b="1" dirty="0"/>
+          </a:p>
+        </p:txBody>
+      </p:sp>
+      <p:sp>
+        <p:nvSpPr>
+          <p:cNvPr id="27" name="ZoneTexte 26">
+            <a:extLst>
+              <a:ext uri="{FF2B5EF4-FFF2-40B4-BE49-F238E27FC236}">
+                <a16:creationId xmlns:a16="http://schemas.microsoft.com/office/drawing/2014/main" id="{EB1E3BCC-FAD3-40D0-AC0A-A0E567337C01}"/>
+              </a:ext>
+            </a:extLst>
+          </p:cNvPr>
+          <p:cNvSpPr txBox="1"/>
+          <p:nvPr/>
+        </p:nvSpPr>
+        <p:spPr>
+          <a:xfrm>
+            <a:off x="9640511" y="1216209"/>
+            <a:ext cx="1989176" cy="276999"/>
+          </a:xfrm>
+          <a:prstGeom prst="rect">
+            <a:avLst/>
+          </a:prstGeom>
+          <a:noFill/>
+        </p:spPr>
+        <p:txBody>
+          <a:bodyPr wrap="square" rtlCol="0">
+            <a:spAutoFit/>
+          </a:bodyPr>
+          <a:lstStyle/>
+          <a:p>
+            <a:pPr algn="ctr"/>
+            <a:r>
+              <a:rPr lang="fr-CA" sz="1200" b="1" dirty="0" err="1"/>
+              <a:t>Daugman’s</a:t>
+            </a:r>
+            <a:r>
+              <a:rPr lang="fr-CA" sz="1200" b="1" dirty="0"/>
+              <a:t> </a:t>
+            </a:r>
+            <a:r>
+              <a:rPr lang="fr-CA" sz="1200" b="1" dirty="0" err="1"/>
+              <a:t>rubber</a:t>
+            </a:r>
+            <a:r>
+              <a:rPr lang="fr-CA" sz="1200" b="1" dirty="0"/>
+              <a:t> </a:t>
+            </a:r>
+            <a:r>
+              <a:rPr lang="fr-CA" sz="1200" b="1" dirty="0" err="1"/>
+              <a:t>sheet</a:t>
+            </a:r>
+            <a:r>
+              <a:rPr lang="fr-CA" sz="1200" b="1" dirty="0"/>
+              <a:t> [2]</a:t>
+            </a:r>
+            <a:endParaRPr lang="en-CA" sz="1200" b="1" dirty="0"/>
+          </a:p>
+        </p:txBody>
+      </p:sp>
+      <p:sp>
+        <p:nvSpPr>
+          <p:cNvPr id="30" name="ZoneTexte 29">
+            <a:extLst>
+              <a:ext uri="{FF2B5EF4-FFF2-40B4-BE49-F238E27FC236}">
+                <a16:creationId xmlns:a16="http://schemas.microsoft.com/office/drawing/2014/main" id="{B9340862-8CF1-4EA4-9E5E-FD126CFCB641}"/>
+              </a:ext>
+            </a:extLst>
+          </p:cNvPr>
+          <p:cNvSpPr txBox="1"/>
+          <p:nvPr/>
+        </p:nvSpPr>
+        <p:spPr>
+          <a:xfrm>
+            <a:off x="10112634" y="4951668"/>
+            <a:ext cx="1044930" cy="369332"/>
+          </a:xfrm>
+          <a:prstGeom prst="rect">
+            <a:avLst/>
+          </a:prstGeom>
+          <a:noFill/>
+        </p:spPr>
+        <p:txBody>
+          <a:bodyPr wrap="square" rtlCol="0">
+            <a:spAutoFit/>
+          </a:bodyPr>
+          <a:lstStyle/>
+          <a:p>
+            <a:pPr algn="ctr"/>
+            <a:r>
+              <a:rPr lang="fr-CA" b="1" dirty="0"/>
+              <a:t>GLCM</a:t>
+            </a:r>
+            <a:r>
+              <a:rPr lang="fr-CA" b="1" baseline="30000" dirty="0"/>
+              <a:t> 1</a:t>
+            </a:r>
+            <a:endParaRPr lang="en-CA" b="1" dirty="0"/>
+          </a:p>
+        </p:txBody>
+      </p:sp>
+      <p:pic>
+        <p:nvPicPr>
+          <p:cNvPr id="32" name="Graphique 31" descr="Base de données avec un remplissage uni">
+            <a:extLst>
+              <a:ext uri="{FF2B5EF4-FFF2-40B4-BE49-F238E27FC236}">
+                <a16:creationId xmlns:a16="http://schemas.microsoft.com/office/drawing/2014/main" id="{5D1681CB-2B4F-4255-B9AA-6467B56590A2}"/>
+              </a:ext>
+            </a:extLst>
+          </p:cNvPr>
+          <p:cNvPicPr>
+            <a:picLocks noChangeAspect="1"/>
+          </p:cNvPicPr>
+          <p:nvPr/>
+        </p:nvPicPr>
+        <p:blipFill>
+          <a:blip r:embed="rId10">
+            <a:extLst>
+              <a:ext uri="{28A0092B-C50C-407E-A947-70E740481C1C}">
+                <a14:useLocalDpi xmlns:a14="http://schemas.microsoft.com/office/drawing/2010/main" val="0"/>
+              </a:ext>
+              <a:ext uri="{96DAC541-7B7A-43D3-8B79-37D633B846F1}">
+                <asvg:svgBlip xmlns:asvg="http://schemas.microsoft.com/office/drawing/2016/SVG/main" r:embed="rId11"/>
+              </a:ext>
+            </a:extLst>
+          </a:blip>
+          <a:stretch>
+            <a:fillRect/>
+          </a:stretch>
+        </p:blipFill>
+        <p:spPr>
+          <a:xfrm>
+            <a:off x="4741536" y="4648272"/>
+            <a:ext cx="914400" cy="914400"/>
+          </a:xfrm>
+          <a:prstGeom prst="rect">
+            <a:avLst/>
+          </a:prstGeom>
+        </p:spPr>
+      </p:pic>
+      <p:sp>
+        <p:nvSpPr>
+          <p:cNvPr id="33" name="Flèche : droite 32">
+            <a:extLst>
+              <a:ext uri="{FF2B5EF4-FFF2-40B4-BE49-F238E27FC236}">
+                <a16:creationId xmlns:a16="http://schemas.microsoft.com/office/drawing/2014/main" id="{208479B8-D81B-4001-8C32-4BEF5DDD0BF4}"/>
               </a:ext>
             </a:extLst>
           </p:cNvPr>
@@ -3755,8 +3937,8 @@
           <p:nvPr/>
         </p:nvSpPr>
         <p:spPr>
-          <a:xfrm>
-            <a:off x="8876422" y="1842959"/>
+          <a:xfrm rot="10800000">
+            <a:off x="8980655" y="4045039"/>
             <a:ext cx="611696" cy="242596"/>
           </a:xfrm>
           <a:prstGeom prst="rightArrow">
@@ -3765,15 +3947,15 @@
         </p:spPr>
         <p:style>
           <a:lnRef idx="2">
-            <a:schemeClr val="dk1">
+            <a:schemeClr val="accent5">
               <a:shade val="50000"/>
             </a:schemeClr>
           </a:lnRef>
           <a:fillRef idx="1">
-            <a:schemeClr val="dk1"/>
+            <a:schemeClr val="accent5"/>
           </a:fillRef>
           <a:effectRef idx="0">
-            <a:schemeClr val="dk1"/>
+            <a:schemeClr val="accent5"/>
           </a:effectRef>
           <a:fontRef idx="minor">
             <a:schemeClr val="lt1"/>
@@ -3790,56 +3972,10 @@
       </p:sp>
       <p:sp>
         <p:nvSpPr>
-          <p:cNvPr id="25" name="Flèche : droite 24">
-            <a:extLst>
-              <a:ext uri="{FF2B5EF4-FFF2-40B4-BE49-F238E27FC236}">
-                <a16:creationId xmlns:a16="http://schemas.microsoft.com/office/drawing/2014/main" id="{778E0673-07DF-4573-A89C-77D5BDF3EA17}"/>
-              </a:ext>
-            </a:extLst>
-          </p:cNvPr>
-          <p:cNvSpPr/>
-          <p:nvPr/>
-        </p:nvSpPr>
-        <p:spPr>
-          <a:xfrm rot="5400000">
-            <a:off x="10329319" y="3379162"/>
-            <a:ext cx="611696" cy="242596"/>
-          </a:xfrm>
-          <a:prstGeom prst="rightArrow">
-            <a:avLst/>
-          </a:prstGeom>
-        </p:spPr>
-        <p:style>
-          <a:lnRef idx="2">
-            <a:schemeClr val="dk1">
-              <a:shade val="50000"/>
-            </a:schemeClr>
-          </a:lnRef>
-          <a:fillRef idx="1">
-            <a:schemeClr val="dk1"/>
-          </a:fillRef>
-          <a:effectRef idx="0">
-            <a:schemeClr val="dk1"/>
-          </a:effectRef>
-          <a:fontRef idx="minor">
-            <a:schemeClr val="lt1"/>
-          </a:fontRef>
-        </p:style>
-        <p:txBody>
-          <a:bodyPr rtlCol="0" anchor="ctr"/>
-          <a:lstStyle/>
-          <a:p>
-            <a:pPr algn="ctr"/>
-            <a:endParaRPr lang="en-CA"/>
-          </a:p>
-        </p:txBody>
-      </p:sp>
-      <p:sp>
-        <p:nvSpPr>
-          <p:cNvPr id="26" name="ZoneTexte 25">
-            <a:extLst>
-              <a:ext uri="{FF2B5EF4-FFF2-40B4-BE49-F238E27FC236}">
-                <a16:creationId xmlns:a16="http://schemas.microsoft.com/office/drawing/2014/main" id="{01822F30-8022-4606-8812-564D6B1F248C}"/>
+          <p:cNvPr id="34" name="ZoneTexte 33">
+            <a:extLst>
+              <a:ext uri="{FF2B5EF4-FFF2-40B4-BE49-F238E27FC236}">
+                <a16:creationId xmlns:a16="http://schemas.microsoft.com/office/drawing/2014/main" id="{0C882BD0-B6F3-4DE1-85B0-79F56B355B72}"/>
               </a:ext>
             </a:extLst>
           </p:cNvPr>
@@ -3848,221 +3984,8 @@
         </p:nvSpPr>
         <p:spPr>
           <a:xfrm>
-            <a:off x="7180001" y="2783335"/>
-            <a:ext cx="1262024" cy="276999"/>
-          </a:xfrm>
-          <a:prstGeom prst="rect">
-            <a:avLst/>
-          </a:prstGeom>
-          <a:noFill/>
-        </p:spPr>
-        <p:txBody>
-          <a:bodyPr wrap="square" rtlCol="0">
-            <a:spAutoFit/>
-          </a:bodyPr>
-          <a:lstStyle/>
-          <a:p>
-            <a:r>
-              <a:rPr lang="fr-CA" sz="1200" dirty="0"/>
-              <a:t>Hough </a:t>
-            </a:r>
-            <a:r>
-              <a:rPr lang="fr-CA" sz="1200" dirty="0" err="1"/>
-              <a:t>Transform</a:t>
-            </a:r>
-            <a:endParaRPr lang="en-CA" sz="1200" dirty="0"/>
-          </a:p>
-        </p:txBody>
-      </p:sp>
-      <p:sp>
-        <p:nvSpPr>
-          <p:cNvPr id="27" name="ZoneTexte 26">
-            <a:extLst>
-              <a:ext uri="{FF2B5EF4-FFF2-40B4-BE49-F238E27FC236}">
-                <a16:creationId xmlns:a16="http://schemas.microsoft.com/office/drawing/2014/main" id="{EB1E3BCC-FAD3-40D0-AC0A-A0E567337C01}"/>
-              </a:ext>
-            </a:extLst>
-          </p:cNvPr>
-          <p:cNvSpPr txBox="1"/>
-          <p:nvPr/>
-        </p:nvSpPr>
-        <p:spPr>
-          <a:xfrm>
-            <a:off x="9780743" y="2524406"/>
-            <a:ext cx="1708848" cy="276999"/>
-          </a:xfrm>
-          <a:prstGeom prst="rect">
-            <a:avLst/>
-          </a:prstGeom>
-          <a:noFill/>
-        </p:spPr>
-        <p:txBody>
-          <a:bodyPr wrap="square" rtlCol="0">
-            <a:spAutoFit/>
-          </a:bodyPr>
-          <a:lstStyle/>
-          <a:p>
-            <a:r>
-              <a:rPr lang="fr-CA" sz="1200" dirty="0" err="1"/>
-              <a:t>Daugman’s</a:t>
-            </a:r>
-            <a:r>
-              <a:rPr lang="fr-CA" sz="1200" dirty="0"/>
-              <a:t> </a:t>
-            </a:r>
-            <a:r>
-              <a:rPr lang="fr-CA" sz="1200" dirty="0" err="1"/>
-              <a:t>rubber</a:t>
-            </a:r>
-            <a:r>
-              <a:rPr lang="fr-CA" sz="1200" dirty="0"/>
-              <a:t> </a:t>
-            </a:r>
-            <a:r>
-              <a:rPr lang="fr-CA" sz="1200" dirty="0" err="1"/>
-              <a:t>sheet</a:t>
-            </a:r>
-            <a:endParaRPr lang="en-CA" sz="1200" dirty="0"/>
-          </a:p>
-        </p:txBody>
-      </p:sp>
-      <p:sp>
-        <p:nvSpPr>
-          <p:cNvPr id="30" name="ZoneTexte 29">
-            <a:extLst>
-              <a:ext uri="{FF2B5EF4-FFF2-40B4-BE49-F238E27FC236}">
-                <a16:creationId xmlns:a16="http://schemas.microsoft.com/office/drawing/2014/main" id="{B9340862-8CF1-4EA4-9E5E-FD126CFCB641}"/>
-              </a:ext>
-            </a:extLst>
-          </p:cNvPr>
-          <p:cNvSpPr txBox="1"/>
-          <p:nvPr/>
-        </p:nvSpPr>
-        <p:spPr>
-          <a:xfrm>
-            <a:off x="10344804" y="5640348"/>
-            <a:ext cx="580726" cy="276999"/>
-          </a:xfrm>
-          <a:prstGeom prst="rect">
-            <a:avLst/>
-          </a:prstGeom>
-          <a:noFill/>
-        </p:spPr>
-        <p:txBody>
-          <a:bodyPr wrap="square" rtlCol="0">
-            <a:spAutoFit/>
-          </a:bodyPr>
-          <a:lstStyle/>
-          <a:p>
-            <a:r>
-              <a:rPr lang="fr-CA" sz="1200" dirty="0"/>
-              <a:t>GLCM</a:t>
-            </a:r>
-            <a:endParaRPr lang="en-CA" sz="1200" dirty="0"/>
-          </a:p>
-        </p:txBody>
-      </p:sp>
-      <p:pic>
-        <p:nvPicPr>
-          <p:cNvPr id="32" name="Graphique 31" descr="Base de données avec un remplissage uni">
-            <a:extLst>
-              <a:ext uri="{FF2B5EF4-FFF2-40B4-BE49-F238E27FC236}">
-                <a16:creationId xmlns:a16="http://schemas.microsoft.com/office/drawing/2014/main" id="{5D1681CB-2B4F-4255-B9AA-6467B56590A2}"/>
-              </a:ext>
-            </a:extLst>
-          </p:cNvPr>
-          <p:cNvPicPr>
-            <a:picLocks noChangeAspect="1"/>
-          </p:cNvPicPr>
-          <p:nvPr/>
-        </p:nvPicPr>
-        <p:blipFill>
-          <a:blip r:embed="rId10">
-            <a:extLst>
-              <a:ext uri="{28A0092B-C50C-407E-A947-70E740481C1C}">
-                <a14:useLocalDpi xmlns:a14="http://schemas.microsoft.com/office/drawing/2010/main" val="0"/>
-              </a:ext>
-              <a:ext uri="{96DAC541-7B7A-43D3-8B79-37D633B846F1}">
-                <asvg:svgBlip xmlns:asvg="http://schemas.microsoft.com/office/drawing/2016/SVG/main" r:embed="rId11"/>
-              </a:ext>
-            </a:extLst>
-          </a:blip>
-          <a:stretch>
-            <a:fillRect/>
-          </a:stretch>
-        </p:blipFill>
-        <p:spPr>
-          <a:xfrm>
-            <a:off x="4343603" y="5778847"/>
-            <a:ext cx="914400" cy="914400"/>
-          </a:xfrm>
-          <a:prstGeom prst="rect">
-            <a:avLst/>
-          </a:prstGeom>
-        </p:spPr>
-      </p:pic>
-      <p:sp>
-        <p:nvSpPr>
-          <p:cNvPr id="33" name="Flèche : droite 32">
-            <a:extLst>
-              <a:ext uri="{FF2B5EF4-FFF2-40B4-BE49-F238E27FC236}">
-                <a16:creationId xmlns:a16="http://schemas.microsoft.com/office/drawing/2014/main" id="{208479B8-D81B-4001-8C32-4BEF5DDD0BF4}"/>
-              </a:ext>
-            </a:extLst>
-          </p:cNvPr>
-          <p:cNvSpPr/>
-          <p:nvPr/>
-        </p:nvSpPr>
-        <p:spPr>
-          <a:xfrm rot="10800000">
-            <a:off x="8953321" y="4671280"/>
-            <a:ext cx="611696" cy="242596"/>
-          </a:xfrm>
-          <a:prstGeom prst="rightArrow">
-            <a:avLst/>
-          </a:prstGeom>
-        </p:spPr>
-        <p:style>
-          <a:lnRef idx="2">
-            <a:schemeClr val="dk1">
-              <a:shade val="50000"/>
-            </a:schemeClr>
-          </a:lnRef>
-          <a:fillRef idx="1">
-            <a:schemeClr val="dk1"/>
-          </a:fillRef>
-          <a:effectRef idx="0">
-            <a:schemeClr val="dk1"/>
-          </a:effectRef>
-          <a:fontRef idx="minor">
-            <a:schemeClr val="lt1"/>
-          </a:fontRef>
-        </p:style>
-        <p:txBody>
-          <a:bodyPr rtlCol="0" anchor="ctr"/>
-          <a:lstStyle/>
-          <a:p>
-            <a:pPr algn="ctr"/>
-            <a:endParaRPr lang="en-CA"/>
-          </a:p>
-        </p:txBody>
-      </p:sp>
-      <p:sp>
-        <p:nvSpPr>
-          <p:cNvPr id="34" name="ZoneTexte 33">
-            <a:extLst>
-              <a:ext uri="{FF2B5EF4-FFF2-40B4-BE49-F238E27FC236}">
-                <a16:creationId xmlns:a16="http://schemas.microsoft.com/office/drawing/2014/main" id="{0C882BD0-B6F3-4DE1-85B0-79F56B355B72}"/>
-              </a:ext>
-            </a:extLst>
-          </p:cNvPr>
-          <p:cNvSpPr txBox="1"/>
-          <p:nvPr/>
-        </p:nvSpPr>
-        <p:spPr>
-          <a:xfrm>
-            <a:off x="6792320" y="4330913"/>
-            <a:ext cx="1866744" cy="923330"/>
+            <a:off x="6863924" y="3843172"/>
+            <a:ext cx="1866744" cy="646331"/>
           </a:xfrm>
           <a:prstGeom prst="rect">
             <a:avLst/>
@@ -4091,16 +4014,8 @@
             <a:pPr algn="ctr"/>
             <a:r>
               <a:rPr lang="fr-CA" dirty="0"/>
-              <a:t>Réduction de dimensionnalité</a:t>
-            </a:r>
-          </a:p>
-          <a:p>
-            <a:pPr algn="ctr"/>
-            <a:r>
-              <a:rPr lang="fr-CA" b="1" dirty="0"/>
-              <a:t>PCA</a:t>
-            </a:r>
-            <a:endParaRPr lang="en-CA" b="1" dirty="0"/>
+              <a:t>Réduction de Dimensionnalité</a:t>
+            </a:r>
           </a:p>
         </p:txBody>
       </p:sp>
@@ -4118,7 +4033,7 @@
         </p:nvSpPr>
         <p:spPr>
           <a:xfrm>
-            <a:off x="3992631" y="4469412"/>
+            <a:off x="4135910" y="3843172"/>
             <a:ext cx="1616344" cy="646331"/>
           </a:xfrm>
           <a:prstGeom prst="rect">
@@ -4148,16 +4063,8 @@
             <a:pPr algn="ctr"/>
             <a:r>
               <a:rPr lang="fr-CA" dirty="0"/>
-              <a:t>Classification</a:t>
-            </a:r>
-          </a:p>
-          <a:p>
-            <a:pPr algn="ctr"/>
-            <a:r>
-              <a:rPr lang="fr-CA" b="1" dirty="0"/>
-              <a:t>k-NN</a:t>
-            </a:r>
-            <a:endParaRPr lang="en-CA" b="1" dirty="0"/>
+              <a:t>Processus de Classification</a:t>
+            </a:r>
           </a:p>
         </p:txBody>
       </p:sp>
@@ -4192,7 +4099,7 @@
         </p:blipFill>
         <p:spPr>
           <a:xfrm>
-            <a:off x="1207991" y="4399905"/>
+            <a:off x="692996" y="3709137"/>
             <a:ext cx="914400" cy="914400"/>
           </a:xfrm>
           <a:prstGeom prst="rect">
@@ -4214,7 +4121,7 @@
         </p:nvSpPr>
         <p:spPr>
           <a:xfrm rot="10800000">
-            <a:off x="5903233" y="4671280"/>
+            <a:off x="6002241" y="4045039"/>
             <a:ext cx="611696" cy="242596"/>
           </a:xfrm>
           <a:prstGeom prst="rightArrow">
@@ -4223,15 +4130,15 @@
         </p:spPr>
         <p:style>
           <a:lnRef idx="2">
-            <a:schemeClr val="dk1">
+            <a:schemeClr val="accent5">
               <a:shade val="50000"/>
             </a:schemeClr>
           </a:lnRef>
           <a:fillRef idx="1">
-            <a:schemeClr val="dk1"/>
+            <a:schemeClr val="accent5"/>
           </a:fillRef>
           <a:effectRef idx="0">
-            <a:schemeClr val="dk1"/>
+            <a:schemeClr val="accent5"/>
           </a:effectRef>
           <a:fontRef idx="minor">
             <a:schemeClr val="lt1"/>
@@ -4260,8 +4167,8 @@
         </p:nvSpPr>
         <p:spPr>
           <a:xfrm rot="10800000">
-            <a:off x="2332139" y="4644042"/>
-            <a:ext cx="1383101" cy="242596"/>
+            <a:off x="1780671" y="4045039"/>
+            <a:ext cx="2105251" cy="242596"/>
           </a:xfrm>
           <a:prstGeom prst="rightArrow">
             <a:avLst/>
@@ -4269,15 +4176,15 @@
         </p:spPr>
         <p:style>
           <a:lnRef idx="2">
-            <a:schemeClr val="dk1">
+            <a:schemeClr val="accent5">
               <a:shade val="50000"/>
             </a:schemeClr>
           </a:lnRef>
           <a:fillRef idx="1">
-            <a:schemeClr val="dk1"/>
+            <a:schemeClr val="accent5"/>
           </a:fillRef>
           <a:effectRef idx="0">
-            <a:schemeClr val="dk1"/>
+            <a:schemeClr val="accent5"/>
           </a:effectRef>
           <a:fontRef idx="minor">
             <a:schemeClr val="lt1"/>
@@ -4305,8 +4212,8 @@
           <p:nvPr/>
         </p:nvSpPr>
         <p:spPr>
-          <a:xfrm rot="16200000">
-            <a:off x="4585126" y="5348622"/>
+          <a:xfrm rot="14193494">
+            <a:off x="4348118" y="4647747"/>
             <a:ext cx="431355" cy="242596"/>
           </a:xfrm>
           <a:prstGeom prst="rightArrow">
@@ -4315,15 +4222,15 @@
         </p:spPr>
         <p:style>
           <a:lnRef idx="2">
-            <a:schemeClr val="dk1">
+            <a:schemeClr val="accent5">
               <a:shade val="50000"/>
             </a:schemeClr>
           </a:lnRef>
           <a:fillRef idx="1">
-            <a:schemeClr val="dk1"/>
+            <a:schemeClr val="accent5"/>
           </a:fillRef>
           <a:effectRef idx="0">
-            <a:schemeClr val="dk1"/>
+            <a:schemeClr val="accent5"/>
           </a:effectRef>
           <a:fontRef idx="minor">
             <a:schemeClr val="lt1"/>
@@ -4352,7 +4259,7 @@
         </p:nvSpPr>
         <p:spPr>
           <a:xfrm>
-            <a:off x="1295248" y="4090100"/>
+            <a:off x="851365" y="3386289"/>
             <a:ext cx="739885" cy="338554"/>
           </a:xfrm>
           <a:prstGeom prst="rect">
@@ -4371,6 +4278,790 @@
               <a:t>Albert</a:t>
             </a:r>
             <a:endParaRPr lang="en-CA" sz="1600" b="1" dirty="0"/>
+          </a:p>
+        </p:txBody>
+      </p:sp>
+      <p:sp>
+        <p:nvSpPr>
+          <p:cNvPr id="2" name="Rectangle 1">
+            <a:extLst>
+              <a:ext uri="{FF2B5EF4-FFF2-40B4-BE49-F238E27FC236}">
+                <a16:creationId xmlns:a16="http://schemas.microsoft.com/office/drawing/2014/main" id="{9EB70F24-C4F2-433A-9C10-4D120FD20881}"/>
+              </a:ext>
+            </a:extLst>
+          </p:cNvPr>
+          <p:cNvSpPr/>
+          <p:nvPr/>
+        </p:nvSpPr>
+        <p:spPr>
+          <a:xfrm>
+            <a:off x="4555194" y="3476430"/>
+            <a:ext cx="777777" cy="369332"/>
+          </a:xfrm>
+          <a:prstGeom prst="rect">
+            <a:avLst/>
+          </a:prstGeom>
+        </p:spPr>
+        <p:txBody>
+          <a:bodyPr wrap="none">
+            <a:spAutoFit/>
+          </a:bodyPr>
+          <a:lstStyle/>
+          <a:p>
+            <a:pPr algn="ctr"/>
+            <a:r>
+              <a:rPr lang="fr-CA" i="1" dirty="0"/>
+              <a:t>k</a:t>
+            </a:r>
+            <a:r>
+              <a:rPr lang="fr-CA" b="1" dirty="0"/>
+              <a:t>-NN</a:t>
+            </a:r>
+            <a:r>
+              <a:rPr lang="fr-CA" b="1" baseline="30000" dirty="0"/>
+              <a:t> 3</a:t>
+            </a:r>
+            <a:endParaRPr lang="en-CA" b="1" dirty="0"/>
+          </a:p>
+        </p:txBody>
+      </p:sp>
+      <p:sp>
+        <p:nvSpPr>
+          <p:cNvPr id="28" name="ZoneTexte 27">
+            <a:extLst>
+              <a:ext uri="{FF2B5EF4-FFF2-40B4-BE49-F238E27FC236}">
+                <a16:creationId xmlns:a16="http://schemas.microsoft.com/office/drawing/2014/main" id="{2273A76E-4F0A-4BCD-82D2-DE979E4F5305}"/>
+              </a:ext>
+            </a:extLst>
+          </p:cNvPr>
+          <p:cNvSpPr txBox="1"/>
+          <p:nvPr/>
+        </p:nvSpPr>
+        <p:spPr>
+          <a:xfrm>
+            <a:off x="7274831" y="3476430"/>
+            <a:ext cx="1044930" cy="369332"/>
+          </a:xfrm>
+          <a:prstGeom prst="rect">
+            <a:avLst/>
+          </a:prstGeom>
+          <a:noFill/>
+        </p:spPr>
+        <p:txBody>
+          <a:bodyPr wrap="square" rtlCol="0">
+            <a:spAutoFit/>
+          </a:bodyPr>
+          <a:lstStyle/>
+          <a:p>
+            <a:pPr algn="ctr"/>
+            <a:r>
+              <a:rPr lang="fr-CA" b="1" dirty="0"/>
+              <a:t>PCA</a:t>
+            </a:r>
+            <a:r>
+              <a:rPr lang="fr-CA" b="1" baseline="30000" dirty="0"/>
+              <a:t> 2</a:t>
+            </a:r>
+            <a:endParaRPr lang="en-CA" b="1" dirty="0"/>
+          </a:p>
+        </p:txBody>
+      </p:sp>
+      <p:sp>
+        <p:nvSpPr>
+          <p:cNvPr id="3" name="Titre 2">
+            <a:extLst>
+              <a:ext uri="{FF2B5EF4-FFF2-40B4-BE49-F238E27FC236}">
+                <a16:creationId xmlns:a16="http://schemas.microsoft.com/office/drawing/2014/main" id="{0640F3B0-0EA7-4CD8-B03A-855409F663D0}"/>
+              </a:ext>
+            </a:extLst>
+          </p:cNvPr>
+          <p:cNvSpPr>
+            <a:spLocks noGrp="1"/>
+          </p:cNvSpPr>
+          <p:nvPr>
+            <p:ph type="title"/>
+          </p:nvPr>
+        </p:nvSpPr>
+        <p:spPr>
+          <a:xfrm>
+            <a:off x="838200" y="149225"/>
+            <a:ext cx="10515600" cy="573579"/>
+          </a:xfrm>
+        </p:spPr>
+        <p:txBody>
+          <a:bodyPr>
+            <a:normAutofit fontScale="90000"/>
+          </a:bodyPr>
+          <a:lstStyle/>
+          <a:p>
+            <a:pPr algn="ctr"/>
+            <a:r>
+              <a:rPr lang="fr-CA" b="1" dirty="0">
+                <a:ln w="0"/>
+                <a:effectLst>
+                  <a:outerShdw blurRad="38100" dist="19050" dir="2700000" algn="tl" rotWithShape="0">
+                    <a:schemeClr val="dk1">
+                      <a:alpha val="40000"/>
+                    </a:schemeClr>
+                  </a:outerShdw>
+                </a:effectLst>
+              </a:rPr>
+              <a:t>Fonctionnement du système biométrique</a:t>
+            </a:r>
+          </a:p>
+        </p:txBody>
+      </p:sp>
+      <p:sp>
+        <p:nvSpPr>
+          <p:cNvPr id="29" name="ZoneTexte 28">
+            <a:extLst>
+              <a:ext uri="{FF2B5EF4-FFF2-40B4-BE49-F238E27FC236}">
+                <a16:creationId xmlns:a16="http://schemas.microsoft.com/office/drawing/2014/main" id="{D0CEB7CF-BB40-4D74-B3EE-5FDF96B9A14B}"/>
+              </a:ext>
+            </a:extLst>
+          </p:cNvPr>
+          <p:cNvSpPr txBox="1"/>
+          <p:nvPr/>
+        </p:nvSpPr>
+        <p:spPr>
+          <a:xfrm>
+            <a:off x="410665" y="2308440"/>
+            <a:ext cx="1479063" cy="276999"/>
+          </a:xfrm>
+          <a:prstGeom prst="rect">
+            <a:avLst/>
+          </a:prstGeom>
+          <a:noFill/>
+        </p:spPr>
+        <p:txBody>
+          <a:bodyPr wrap="square" rtlCol="0">
+            <a:spAutoFit/>
+          </a:bodyPr>
+          <a:lstStyle/>
+          <a:p>
+            <a:pPr algn="ctr"/>
+            <a:r>
+              <a:rPr lang="fr-CA" sz="1200" i="1" dirty="0"/>
+              <a:t>Identité inconnue</a:t>
+            </a:r>
+            <a:endParaRPr lang="en-CA" sz="1200" i="1" dirty="0"/>
+          </a:p>
+        </p:txBody>
+      </p:sp>
+      <p:sp>
+        <p:nvSpPr>
+          <p:cNvPr id="31" name="ZoneTexte 30">
+            <a:extLst>
+              <a:ext uri="{FF2B5EF4-FFF2-40B4-BE49-F238E27FC236}">
+                <a16:creationId xmlns:a16="http://schemas.microsoft.com/office/drawing/2014/main" id="{A824D995-582F-4BB3-808E-FE248A7A7C9B}"/>
+              </a:ext>
+            </a:extLst>
+          </p:cNvPr>
+          <p:cNvSpPr txBox="1"/>
+          <p:nvPr/>
+        </p:nvSpPr>
+        <p:spPr>
+          <a:xfrm>
+            <a:off x="410665" y="4509772"/>
+            <a:ext cx="1479063" cy="276999"/>
+          </a:xfrm>
+          <a:prstGeom prst="rect">
+            <a:avLst/>
+          </a:prstGeom>
+          <a:noFill/>
+        </p:spPr>
+        <p:txBody>
+          <a:bodyPr wrap="square" rtlCol="0">
+            <a:spAutoFit/>
+          </a:bodyPr>
+          <a:lstStyle/>
+          <a:p>
+            <a:pPr algn="ctr"/>
+            <a:r>
+              <a:rPr lang="fr-CA" sz="1200" i="1" dirty="0"/>
+              <a:t>Personne identifiée</a:t>
+            </a:r>
+            <a:endParaRPr lang="en-CA" sz="1200" i="1" dirty="0"/>
+          </a:p>
+        </p:txBody>
+      </p:sp>
+      <p:pic>
+        <p:nvPicPr>
+          <p:cNvPr id="6" name="Graphique 5" descr="Ampoule">
+            <a:extLst>
+              <a:ext uri="{FF2B5EF4-FFF2-40B4-BE49-F238E27FC236}">
+                <a16:creationId xmlns:a16="http://schemas.microsoft.com/office/drawing/2014/main" id="{57D141E5-3DD7-44BA-8F32-DC8426117F41}"/>
+              </a:ext>
+            </a:extLst>
+          </p:cNvPr>
+          <p:cNvPicPr>
+            <a:picLocks noChangeAspect="1"/>
+          </p:cNvPicPr>
+          <p:nvPr/>
+        </p:nvPicPr>
+        <p:blipFill>
+          <a:blip r:embed="rId12">
+            <a:extLst>
+              <a:ext uri="{28A0092B-C50C-407E-A947-70E740481C1C}">
+                <a14:useLocalDpi xmlns:a14="http://schemas.microsoft.com/office/drawing/2010/main" val="0"/>
+              </a:ext>
+              <a:ext uri="{96DAC541-7B7A-43D3-8B79-37D633B846F1}">
+                <asvg:svgBlip xmlns:asvg="http://schemas.microsoft.com/office/drawing/2016/SVG/main" r:embed="rId13"/>
+              </a:ext>
+            </a:extLst>
+          </a:blip>
+          <a:stretch>
+            <a:fillRect/>
+          </a:stretch>
+        </p:blipFill>
+        <p:spPr>
+          <a:xfrm>
+            <a:off x="375054" y="3307123"/>
+            <a:ext cx="640800" cy="640800"/>
+          </a:xfrm>
+          <a:prstGeom prst="rect">
+            <a:avLst/>
+          </a:prstGeom>
+        </p:spPr>
+      </p:pic>
+      <p:sp>
+        <p:nvSpPr>
+          <p:cNvPr id="41" name="ZoneTexte 40">
+            <a:extLst>
+              <a:ext uri="{FF2B5EF4-FFF2-40B4-BE49-F238E27FC236}">
+                <a16:creationId xmlns:a16="http://schemas.microsoft.com/office/drawing/2014/main" id="{720BB4A0-68EC-499A-9AE1-F2C991BA8D21}"/>
+              </a:ext>
+            </a:extLst>
+          </p:cNvPr>
+          <p:cNvSpPr txBox="1"/>
+          <p:nvPr/>
+        </p:nvSpPr>
+        <p:spPr>
+          <a:xfrm>
+            <a:off x="2278461" y="2308440"/>
+            <a:ext cx="1479063" cy="276999"/>
+          </a:xfrm>
+          <a:prstGeom prst="rect">
+            <a:avLst/>
+          </a:prstGeom>
+          <a:noFill/>
+        </p:spPr>
+        <p:txBody>
+          <a:bodyPr wrap="square" rtlCol="0">
+            <a:spAutoFit/>
+          </a:bodyPr>
+          <a:lstStyle/>
+          <a:p>
+            <a:pPr algn="ctr"/>
+            <a:r>
+              <a:rPr lang="fr-CA" sz="1200" i="1" dirty="0"/>
+              <a:t>Capteur</a:t>
+            </a:r>
+            <a:endParaRPr lang="en-CA" sz="1200" i="1" dirty="0"/>
+          </a:p>
+        </p:txBody>
+      </p:sp>
+      <p:sp>
+        <p:nvSpPr>
+          <p:cNvPr id="42" name="ZoneTexte 41">
+            <a:extLst>
+              <a:ext uri="{FF2B5EF4-FFF2-40B4-BE49-F238E27FC236}">
+                <a16:creationId xmlns:a16="http://schemas.microsoft.com/office/drawing/2014/main" id="{072FC63A-C123-4D46-B842-42B39AE7F882}"/>
+              </a:ext>
+            </a:extLst>
+          </p:cNvPr>
+          <p:cNvSpPr txBox="1"/>
+          <p:nvPr/>
+        </p:nvSpPr>
+        <p:spPr>
+          <a:xfrm>
+            <a:off x="4520780" y="2537031"/>
+            <a:ext cx="1479063" cy="276999"/>
+          </a:xfrm>
+          <a:prstGeom prst="rect">
+            <a:avLst/>
+          </a:prstGeom>
+          <a:noFill/>
+        </p:spPr>
+        <p:txBody>
+          <a:bodyPr wrap="square" rtlCol="0">
+            <a:spAutoFit/>
+          </a:bodyPr>
+          <a:lstStyle/>
+          <a:p>
+            <a:pPr algn="ctr"/>
+            <a:r>
+              <a:rPr lang="fr-CA" sz="1200" i="1" dirty="0"/>
+              <a:t>Zone de l’œil</a:t>
+            </a:r>
+            <a:endParaRPr lang="en-CA" sz="1200" i="1" dirty="0"/>
+          </a:p>
+        </p:txBody>
+      </p:sp>
+      <p:sp>
+        <p:nvSpPr>
+          <p:cNvPr id="9" name="Rectangle 8">
+            <a:extLst>
+              <a:ext uri="{FF2B5EF4-FFF2-40B4-BE49-F238E27FC236}">
+                <a16:creationId xmlns:a16="http://schemas.microsoft.com/office/drawing/2014/main" id="{68230987-E320-4DC0-9178-B36497AC071C}"/>
+              </a:ext>
+            </a:extLst>
+          </p:cNvPr>
+          <p:cNvSpPr/>
+          <p:nvPr/>
+        </p:nvSpPr>
+        <p:spPr>
+          <a:xfrm>
+            <a:off x="6578593" y="818054"/>
+            <a:ext cx="5155373" cy="2014635"/>
+          </a:xfrm>
+          <a:prstGeom prst="rect">
+            <a:avLst/>
+          </a:prstGeom>
+          <a:noFill/>
+          <a:ln>
+            <a:prstDash val="lgDashDot"/>
+          </a:ln>
+        </p:spPr>
+        <p:style>
+          <a:lnRef idx="2">
+            <a:schemeClr val="accent5"/>
+          </a:lnRef>
+          <a:fillRef idx="1">
+            <a:schemeClr val="lt1"/>
+          </a:fillRef>
+          <a:effectRef idx="0">
+            <a:schemeClr val="accent5"/>
+          </a:effectRef>
+          <a:fontRef idx="minor">
+            <a:schemeClr val="dk1"/>
+          </a:fontRef>
+        </p:style>
+        <p:txBody>
+          <a:bodyPr rtlCol="0" anchor="ctr"/>
+          <a:lstStyle/>
+          <a:p>
+            <a:pPr algn="ctr"/>
+            <a:endParaRPr lang="fr-CA"/>
+          </a:p>
+        </p:txBody>
+      </p:sp>
+      <p:sp>
+        <p:nvSpPr>
+          <p:cNvPr id="44" name="Flèche : droite 43">
+            <a:extLst>
+              <a:ext uri="{FF2B5EF4-FFF2-40B4-BE49-F238E27FC236}">
+                <a16:creationId xmlns:a16="http://schemas.microsoft.com/office/drawing/2014/main" id="{00F7A1C3-CBB6-4026-9BB4-8789159413F6}"/>
+              </a:ext>
+            </a:extLst>
+          </p:cNvPr>
+          <p:cNvSpPr/>
+          <p:nvPr/>
+        </p:nvSpPr>
+        <p:spPr>
+          <a:xfrm>
+            <a:off x="6272745" y="1819290"/>
+            <a:ext cx="611696" cy="242596"/>
+          </a:xfrm>
+          <a:prstGeom prst="rightArrow">
+            <a:avLst/>
+          </a:prstGeom>
+        </p:spPr>
+        <p:style>
+          <a:lnRef idx="2">
+            <a:schemeClr val="accent5">
+              <a:shade val="50000"/>
+            </a:schemeClr>
+          </a:lnRef>
+          <a:fillRef idx="1">
+            <a:schemeClr val="accent5"/>
+          </a:fillRef>
+          <a:effectRef idx="0">
+            <a:schemeClr val="accent5"/>
+          </a:effectRef>
+          <a:fontRef idx="minor">
+            <a:schemeClr val="lt1"/>
+          </a:fontRef>
+        </p:style>
+        <p:txBody>
+          <a:bodyPr rtlCol="0" anchor="ctr"/>
+          <a:lstStyle/>
+          <a:p>
+            <a:pPr algn="ctr"/>
+            <a:endParaRPr lang="en-CA"/>
+          </a:p>
+        </p:txBody>
+      </p:sp>
+      <p:sp>
+        <p:nvSpPr>
+          <p:cNvPr id="45" name="Flèche : droite 44">
+            <a:extLst>
+              <a:ext uri="{FF2B5EF4-FFF2-40B4-BE49-F238E27FC236}">
+                <a16:creationId xmlns:a16="http://schemas.microsoft.com/office/drawing/2014/main" id="{077253DC-67F2-4592-BABE-BFB489DA88A5}"/>
+              </a:ext>
+            </a:extLst>
+          </p:cNvPr>
+          <p:cNvSpPr/>
+          <p:nvPr/>
+        </p:nvSpPr>
+        <p:spPr>
+          <a:xfrm rot="5400000">
+            <a:off x="10329251" y="2769194"/>
+            <a:ext cx="611696" cy="242596"/>
+          </a:xfrm>
+          <a:prstGeom prst="rightArrow">
+            <a:avLst/>
+          </a:prstGeom>
+        </p:spPr>
+        <p:style>
+          <a:lnRef idx="2">
+            <a:schemeClr val="accent5">
+              <a:shade val="50000"/>
+            </a:schemeClr>
+          </a:lnRef>
+          <a:fillRef idx="1">
+            <a:schemeClr val="accent5"/>
+          </a:fillRef>
+          <a:effectRef idx="0">
+            <a:schemeClr val="accent5"/>
+          </a:effectRef>
+          <a:fontRef idx="minor">
+            <a:schemeClr val="lt1"/>
+          </a:fontRef>
+        </p:style>
+        <p:txBody>
+          <a:bodyPr rtlCol="0" anchor="ctr"/>
+          <a:lstStyle/>
+          <a:p>
+            <a:pPr algn="ctr"/>
+            <a:endParaRPr lang="en-CA"/>
+          </a:p>
+        </p:txBody>
+      </p:sp>
+      <p:sp>
+        <p:nvSpPr>
+          <p:cNvPr id="46" name="ZoneTexte 45">
+            <a:extLst>
+              <a:ext uri="{FF2B5EF4-FFF2-40B4-BE49-F238E27FC236}">
+                <a16:creationId xmlns:a16="http://schemas.microsoft.com/office/drawing/2014/main" id="{C4BB3439-9219-4CC2-B6B1-63CF108D0001}"/>
+              </a:ext>
+            </a:extLst>
+          </p:cNvPr>
+          <p:cNvSpPr txBox="1"/>
+          <p:nvPr/>
+        </p:nvSpPr>
+        <p:spPr>
+          <a:xfrm>
+            <a:off x="6578593" y="2827162"/>
+            <a:ext cx="1860477" cy="369332"/>
+          </a:xfrm>
+          <a:prstGeom prst="rect">
+            <a:avLst/>
+          </a:prstGeom>
+          <a:noFill/>
+        </p:spPr>
+        <p:txBody>
+          <a:bodyPr wrap="square" rtlCol="0">
+            <a:spAutoFit/>
+          </a:bodyPr>
+          <a:lstStyle/>
+          <a:p>
+            <a:r>
+              <a:rPr lang="fr-CA" dirty="0">
+                <a:ln w="0"/>
+                <a:solidFill>
+                  <a:schemeClr val="accent5"/>
+                </a:solidFill>
+                <a:effectLst>
+                  <a:outerShdw blurRad="38100" dist="25400" dir="5400000" algn="ctr" rotWithShape="0">
+                    <a:srgbClr val="6E747A">
+                      <a:alpha val="43000"/>
+                    </a:srgbClr>
+                  </a:outerShdw>
+                </a:effectLst>
+              </a:rPr>
+              <a:t>Pré-traitements</a:t>
+            </a:r>
+            <a:endParaRPr lang="en-CA" dirty="0">
+              <a:ln w="0"/>
+              <a:solidFill>
+                <a:schemeClr val="accent5"/>
+              </a:solidFill>
+              <a:effectLst>
+                <a:outerShdw blurRad="38100" dist="25400" dir="5400000" algn="ctr" rotWithShape="0">
+                  <a:srgbClr val="6E747A">
+                    <a:alpha val="43000"/>
+                  </a:srgbClr>
+                </a:outerShdw>
+              </a:effectLst>
+            </a:endParaRPr>
+          </a:p>
+        </p:txBody>
+      </p:sp>
+      <p:sp>
+        <p:nvSpPr>
+          <p:cNvPr id="11" name="Rectangle 10">
+            <a:extLst>
+              <a:ext uri="{FF2B5EF4-FFF2-40B4-BE49-F238E27FC236}">
+                <a16:creationId xmlns:a16="http://schemas.microsoft.com/office/drawing/2014/main" id="{23F057C1-3638-4305-ABC0-23D44B819A6B}"/>
+              </a:ext>
+            </a:extLst>
+          </p:cNvPr>
+          <p:cNvSpPr/>
+          <p:nvPr/>
+        </p:nvSpPr>
+        <p:spPr>
+          <a:xfrm>
+            <a:off x="4185909" y="5499986"/>
+            <a:ext cx="2025653" cy="584775"/>
+          </a:xfrm>
+          <a:prstGeom prst="rect">
+            <a:avLst/>
+          </a:prstGeom>
+        </p:spPr>
+        <p:txBody>
+          <a:bodyPr wrap="square">
+            <a:spAutoFit/>
+          </a:bodyPr>
+          <a:lstStyle/>
+          <a:p>
+            <a:pPr algn="ctr"/>
+            <a:r>
+              <a:rPr lang="fr-CA" sz="1600" i="1" dirty="0"/>
+              <a:t>Base de données de référence</a:t>
+            </a:r>
+          </a:p>
+        </p:txBody>
+      </p:sp>
+      <p:sp>
+        <p:nvSpPr>
+          <p:cNvPr id="47" name="ZoneTexte 46">
+            <a:extLst>
+              <a:ext uri="{FF2B5EF4-FFF2-40B4-BE49-F238E27FC236}">
+                <a16:creationId xmlns:a16="http://schemas.microsoft.com/office/drawing/2014/main" id="{E540F958-0C72-4714-8289-69BD0B937B3A}"/>
+              </a:ext>
+            </a:extLst>
+          </p:cNvPr>
+          <p:cNvSpPr txBox="1"/>
+          <p:nvPr/>
+        </p:nvSpPr>
+        <p:spPr>
+          <a:xfrm>
+            <a:off x="7215589" y="5765629"/>
+            <a:ext cx="4314824" cy="923330"/>
+          </a:xfrm>
+          <a:prstGeom prst="rect">
+            <a:avLst/>
+          </a:prstGeom>
+        </p:spPr>
+        <p:style>
+          <a:lnRef idx="2">
+            <a:schemeClr val="accent5"/>
+          </a:lnRef>
+          <a:fillRef idx="1">
+            <a:schemeClr val="lt1"/>
+          </a:fillRef>
+          <a:effectRef idx="0">
+            <a:schemeClr val="accent5"/>
+          </a:effectRef>
+          <a:fontRef idx="minor">
+            <a:schemeClr val="dk1"/>
+          </a:fontRef>
+        </p:style>
+        <p:txBody>
+          <a:bodyPr wrap="square" rtlCol="0">
+            <a:spAutoFit/>
+          </a:bodyPr>
+          <a:lstStyle/>
+          <a:p>
+            <a:r>
+              <a:rPr lang="fr-CA" b="1" baseline="30000" dirty="0"/>
+              <a:t>1 </a:t>
+            </a:r>
+            <a:r>
+              <a:rPr lang="fr-CA" b="1" dirty="0"/>
+              <a:t>G</a:t>
+            </a:r>
+            <a:r>
+              <a:rPr lang="fr-CA" dirty="0"/>
+              <a:t>ray-</a:t>
+            </a:r>
+            <a:r>
+              <a:rPr lang="fr-CA" b="1" dirty="0" err="1"/>
+              <a:t>L</a:t>
+            </a:r>
+            <a:r>
+              <a:rPr lang="fr-CA" dirty="0" err="1"/>
+              <a:t>evel</a:t>
+            </a:r>
+            <a:r>
+              <a:rPr lang="fr-CA" dirty="0"/>
+              <a:t> </a:t>
+            </a:r>
+            <a:r>
+              <a:rPr lang="fr-CA" b="1" dirty="0"/>
+              <a:t>C</a:t>
+            </a:r>
+            <a:r>
+              <a:rPr lang="fr-CA" dirty="0"/>
+              <a:t>o-occurrence </a:t>
+            </a:r>
+            <a:r>
+              <a:rPr lang="fr-CA" b="1" dirty="0"/>
+              <a:t>M</a:t>
+            </a:r>
+            <a:r>
+              <a:rPr lang="fr-CA" dirty="0"/>
+              <a:t>atrix</a:t>
+            </a:r>
+            <a:br>
+              <a:rPr lang="fr-CA" dirty="0"/>
+            </a:br>
+            <a:r>
+              <a:rPr lang="fr-CA" b="1" baseline="30000" dirty="0"/>
+              <a:t>2 </a:t>
+            </a:r>
+            <a:r>
+              <a:rPr lang="fr-CA" b="1" dirty="0"/>
+              <a:t>P</a:t>
+            </a:r>
+            <a:r>
+              <a:rPr lang="fr-CA" dirty="0"/>
+              <a:t>rincipal</a:t>
+            </a:r>
+            <a:r>
+              <a:rPr lang="fr-CA" b="1" dirty="0"/>
+              <a:t> C</a:t>
+            </a:r>
+            <a:r>
+              <a:rPr lang="fr-CA" dirty="0"/>
+              <a:t>omponent</a:t>
+            </a:r>
+            <a:r>
+              <a:rPr lang="fr-CA" b="1" dirty="0"/>
+              <a:t> </a:t>
+            </a:r>
+            <a:r>
+              <a:rPr lang="fr-CA" b="1" dirty="0" err="1"/>
+              <a:t>A</a:t>
+            </a:r>
+            <a:r>
+              <a:rPr lang="fr-CA" dirty="0" err="1"/>
+              <a:t>nalysis</a:t>
+            </a:r>
+            <a:endParaRPr lang="fr-CA" dirty="0"/>
+          </a:p>
+          <a:p>
+            <a:r>
+              <a:rPr lang="fr-CA" b="1" baseline="30000" dirty="0"/>
+              <a:t>3 </a:t>
+            </a:r>
+            <a:r>
+              <a:rPr lang="fr-CA" i="1" dirty="0"/>
+              <a:t>k-</a:t>
+            </a:r>
+            <a:r>
+              <a:rPr lang="fr-CA" b="1" dirty="0" err="1"/>
+              <a:t>N</a:t>
+            </a:r>
+            <a:r>
+              <a:rPr lang="fr-CA" dirty="0" err="1"/>
+              <a:t>earest</a:t>
+            </a:r>
+            <a:r>
+              <a:rPr lang="fr-CA" dirty="0"/>
+              <a:t> </a:t>
+            </a:r>
+            <a:r>
+              <a:rPr lang="fr-CA" b="1" dirty="0"/>
+              <a:t>N</a:t>
+            </a:r>
+            <a:r>
+              <a:rPr lang="fr-CA" dirty="0"/>
+              <a:t>eighbors</a:t>
+            </a:r>
+            <a:endParaRPr lang="en-CA" i="1" dirty="0"/>
+          </a:p>
+        </p:txBody>
+      </p:sp>
+      <p:sp>
+        <p:nvSpPr>
+          <p:cNvPr id="13" name="Rectangle 12">
+            <a:extLst>
+              <a:ext uri="{FF2B5EF4-FFF2-40B4-BE49-F238E27FC236}">
+                <a16:creationId xmlns:a16="http://schemas.microsoft.com/office/drawing/2014/main" id="{AE1F2336-4E67-4B17-B47B-0B10070BEFDB}"/>
+              </a:ext>
+            </a:extLst>
+          </p:cNvPr>
+          <p:cNvSpPr/>
+          <p:nvPr/>
+        </p:nvSpPr>
+        <p:spPr>
+          <a:xfrm>
+            <a:off x="122133" y="6208902"/>
+            <a:ext cx="7093456" cy="577081"/>
+          </a:xfrm>
+          <a:prstGeom prst="rect">
+            <a:avLst/>
+          </a:prstGeom>
+        </p:spPr>
+        <p:txBody>
+          <a:bodyPr wrap="square">
+            <a:spAutoFit/>
+          </a:bodyPr>
+          <a:lstStyle/>
+          <a:p>
+            <a:r>
+              <a:rPr lang="en-US" sz="1050" dirty="0"/>
+              <a:t>[1] </a:t>
+            </a:r>
+            <a:r>
+              <a:rPr lang="en-US" sz="1050" dirty="0" err="1"/>
+              <a:t>Haralick</a:t>
+            </a:r>
+            <a:r>
+              <a:rPr lang="en-US" sz="1050" dirty="0"/>
+              <a:t>, R. M., Shanmugam, K., &amp; </a:t>
+            </a:r>
+            <a:r>
+              <a:rPr lang="en-US" sz="1050" dirty="0" err="1"/>
+              <a:t>Dinstein</a:t>
+            </a:r>
+            <a:r>
+              <a:rPr lang="en-US" sz="1050" dirty="0"/>
+              <a:t>, I. H. (1973). Textural features for image classification. </a:t>
+            </a:r>
+            <a:r>
+              <a:rPr lang="en-US" sz="1050" i="1" dirty="0"/>
+              <a:t>IEEE Transactions on systems, man, and cybernetics</a:t>
+            </a:r>
+            <a:r>
+              <a:rPr lang="en-US" sz="1050" dirty="0"/>
+              <a:t>, (6), 610-621.</a:t>
+            </a:r>
+            <a:br>
+              <a:rPr lang="en-US" sz="1050" dirty="0"/>
+            </a:br>
+            <a:r>
+              <a:rPr lang="en-US" sz="1050" dirty="0"/>
+              <a:t>[2] </a:t>
+            </a:r>
+            <a:r>
+              <a:rPr lang="en-US" sz="1050" dirty="0" err="1"/>
+              <a:t>Daugman</a:t>
+            </a:r>
+            <a:r>
+              <a:rPr lang="en-US" sz="1050" dirty="0"/>
+              <a:t>, J. (2009). How iris recognition works. In </a:t>
+            </a:r>
+            <a:r>
+              <a:rPr lang="en-US" sz="1050" i="1" dirty="0"/>
+              <a:t>The essential guide to image processing</a:t>
+            </a:r>
+            <a:r>
+              <a:rPr lang="en-US" sz="1050" dirty="0"/>
+              <a:t> (pp. 715-739). Academic Press.</a:t>
+            </a:r>
           </a:p>
         </p:txBody>
       </p:sp>
@@ -4439,33 +5130,15 @@
                                   </p:childTnLst>
                                 </p:cTn>
                               </p:par>
-                            </p:childTnLst>
-                          </p:cTn>
-                        </p:par>
-                      </p:childTnLst>
-                    </p:cTn>
-                  </p:par>
-                  <p:par>
-                    <p:cTn id="8" fill="hold">
-                      <p:stCondLst>
-                        <p:cond delay="indefinite"/>
-                      </p:stCondLst>
-                      <p:childTnLst>
-                        <p:par>
-                          <p:cTn id="9" fill="hold">
-                            <p:stCondLst>
-                              <p:cond delay="0"/>
-                            </p:stCondLst>
-                            <p:childTnLst>
                               <p:par>
-                                <p:cTn id="10" presetID="10" presetClass="entr" presetSubtype="0" fill="hold" nodeType="clickEffect">
+                                <p:cTn id="8" presetID="10" presetClass="entr" presetSubtype="0" fill="hold" nodeType="withEffect">
                                   <p:stCondLst>
                                     <p:cond delay="0"/>
                                   </p:stCondLst>
                                   <p:childTnLst>
                                     <p:set>
                                       <p:cBhvr>
-                                        <p:cTn id="11" dur="1" fill="hold">
+                                        <p:cTn id="9" dur="1" fill="hold">
                                           <p:stCondLst>
                                             <p:cond delay="0"/>
                                           </p:stCondLst>
@@ -4483,9 +5156,44 @@
                                     </p:set>
                                     <p:animEffect transition="in" filter="fade">
                                       <p:cBhvr>
-                                        <p:cTn id="12" dur="500"/>
+                                        <p:cTn id="10" dur="500"/>
                                         <p:tgtEl>
                                           <p:spTgt spid="10"/>
+                                        </p:tgtEl>
+                                      </p:cBhvr>
+                                    </p:animEffect>
+                                  </p:childTnLst>
+                                </p:cTn>
+                              </p:par>
+                              <p:par>
+                                <p:cTn id="11" presetID="10" presetClass="entr" presetSubtype="0" fill="hold" grpId="0" nodeType="withEffect">
+                                  <p:stCondLst>
+                                    <p:cond delay="0"/>
+                                  </p:stCondLst>
+                                  <p:childTnLst>
+                                    <p:set>
+                                      <p:cBhvr>
+                                        <p:cTn id="12" dur="1" fill="hold">
+                                          <p:stCondLst>
+                                            <p:cond delay="0"/>
+                                          </p:stCondLst>
+                                        </p:cTn>
+                                        <p:tgtEl>
+                                          <p:spTgt spid="41"/>
+                                        </p:tgtEl>
+                                        <p:attrNameLst>
+                                          <p:attrName>style.visibility</p:attrName>
+                                        </p:attrNameLst>
+                                      </p:cBhvr>
+                                      <p:to>
+                                        <p:strVal val="visible"/>
+                                      </p:to>
+                                    </p:set>
+                                    <p:animEffect transition="in" filter="fade">
+                                      <p:cBhvr>
+                                        <p:cTn id="13" dur="500"/>
+                                        <p:tgtEl>
+                                          <p:spTgt spid="41"/>
                                         </p:tgtEl>
                                       </p:cBhvr>
                                     </p:animEffect>
@@ -4499,26 +5207,26 @@
                     </p:cTn>
                   </p:par>
                   <p:par>
-                    <p:cTn id="13" fill="hold">
+                    <p:cTn id="14" fill="hold">
                       <p:stCondLst>
                         <p:cond delay="indefinite"/>
                       </p:stCondLst>
                       <p:childTnLst>
                         <p:par>
-                          <p:cTn id="14" fill="hold">
+                          <p:cTn id="15" fill="hold">
                             <p:stCondLst>
                               <p:cond delay="0"/>
                             </p:stCondLst>
                             <p:childTnLst>
                               <p:par>
-                                <p:cTn id="15" presetID="10" presetClass="entr" presetSubtype="0" fill="hold" grpId="0" nodeType="clickEffect">
+                                <p:cTn id="16" presetID="10" presetClass="entr" presetSubtype="0" fill="hold" grpId="0" nodeType="clickEffect">
                                   <p:stCondLst>
                                     <p:cond delay="0"/>
                                   </p:stCondLst>
                                   <p:childTnLst>
                                     <p:set>
                                       <p:cBhvr>
-                                        <p:cTn id="16" dur="1" fill="hold">
+                                        <p:cTn id="17" dur="1" fill="hold">
                                           <p:stCondLst>
                                             <p:cond delay="0"/>
                                           </p:stCondLst>
@@ -4536,7 +5244,7 @@
                                     </p:set>
                                     <p:animEffect transition="in" filter="fade">
                                       <p:cBhvr>
-                                        <p:cTn id="17" dur="500"/>
+                                        <p:cTn id="18" dur="500"/>
                                         <p:tgtEl>
                                           <p:spTgt spid="22"/>
                                         </p:tgtEl>
@@ -4545,33 +5253,15 @@
                                   </p:childTnLst>
                                 </p:cTn>
                               </p:par>
-                            </p:childTnLst>
-                          </p:cTn>
-                        </p:par>
-                      </p:childTnLst>
-                    </p:cTn>
-                  </p:par>
-                  <p:par>
-                    <p:cTn id="18" fill="hold">
-                      <p:stCondLst>
-                        <p:cond delay="indefinite"/>
-                      </p:stCondLst>
-                      <p:childTnLst>
-                        <p:par>
-                          <p:cTn id="19" fill="hold">
-                            <p:stCondLst>
-                              <p:cond delay="0"/>
-                            </p:stCondLst>
-                            <p:childTnLst>
                               <p:par>
-                                <p:cTn id="20" presetID="10" presetClass="entr" presetSubtype="0" fill="hold" nodeType="clickEffect">
+                                <p:cTn id="19" presetID="10" presetClass="entr" presetSubtype="0" fill="hold" nodeType="withEffect">
                                   <p:stCondLst>
                                     <p:cond delay="0"/>
                                   </p:stCondLst>
                                   <p:childTnLst>
                                     <p:set>
                                       <p:cBhvr>
-                                        <p:cTn id="21" dur="1" fill="hold">
+                                        <p:cTn id="20" dur="1" fill="hold">
                                           <p:stCondLst>
                                             <p:cond delay="0"/>
                                           </p:stCondLst>
@@ -4589,9 +5279,44 @@
                                     </p:set>
                                     <p:animEffect transition="in" filter="fade">
                                       <p:cBhvr>
-                                        <p:cTn id="22" dur="500"/>
+                                        <p:cTn id="21" dur="500"/>
                                         <p:tgtEl>
                                           <p:spTgt spid="14"/>
+                                        </p:tgtEl>
+                                      </p:cBhvr>
+                                    </p:animEffect>
+                                  </p:childTnLst>
+                                </p:cTn>
+                              </p:par>
+                              <p:par>
+                                <p:cTn id="22" presetID="10" presetClass="entr" presetSubtype="0" fill="hold" grpId="0" nodeType="withEffect">
+                                  <p:stCondLst>
+                                    <p:cond delay="0"/>
+                                  </p:stCondLst>
+                                  <p:childTnLst>
+                                    <p:set>
+                                      <p:cBhvr>
+                                        <p:cTn id="23" dur="1" fill="hold">
+                                          <p:stCondLst>
+                                            <p:cond delay="0"/>
+                                          </p:stCondLst>
+                                        </p:cTn>
+                                        <p:tgtEl>
+                                          <p:spTgt spid="42"/>
+                                        </p:tgtEl>
+                                        <p:attrNameLst>
+                                          <p:attrName>style.visibility</p:attrName>
+                                        </p:attrNameLst>
+                                      </p:cBhvr>
+                                      <p:to>
+                                        <p:strVal val="visible"/>
+                                      </p:to>
+                                    </p:set>
+                                    <p:animEffect transition="in" filter="fade">
+                                      <p:cBhvr>
+                                        <p:cTn id="24" dur="500"/>
+                                        <p:tgtEl>
+                                          <p:spTgt spid="42"/>
                                         </p:tgtEl>
                                       </p:cBhvr>
                                     </p:animEffect>
@@ -4605,32 +5330,32 @@
                     </p:cTn>
                   </p:par>
                   <p:par>
-                    <p:cTn id="23" fill="hold">
+                    <p:cTn id="25" fill="hold">
                       <p:stCondLst>
                         <p:cond delay="indefinite"/>
                       </p:stCondLst>
                       <p:childTnLst>
                         <p:par>
-                          <p:cTn id="24" fill="hold">
+                          <p:cTn id="26" fill="hold">
                             <p:stCondLst>
                               <p:cond delay="0"/>
                             </p:stCondLst>
                             <p:childTnLst>
                               <p:par>
-                                <p:cTn id="25" presetID="10" presetClass="entr" presetSubtype="0" fill="hold" grpId="0" nodeType="clickEffect">
+                                <p:cTn id="27" presetID="10" presetClass="entr" presetSubtype="0" fill="hold" grpId="0" nodeType="clickEffect">
                                   <p:stCondLst>
                                     <p:cond delay="0"/>
                                   </p:stCondLst>
                                   <p:childTnLst>
                                     <p:set>
                                       <p:cBhvr>
-                                        <p:cTn id="26" dur="1" fill="hold">
+                                        <p:cTn id="28" dur="1" fill="hold">
                                           <p:stCondLst>
                                             <p:cond delay="0"/>
                                           </p:stCondLst>
                                         </p:cTn>
                                         <p:tgtEl>
-                                          <p:spTgt spid="23"/>
+                                          <p:spTgt spid="9"/>
                                         </p:tgtEl>
                                         <p:attrNameLst>
                                           <p:attrName>style.visibility</p:attrName>
@@ -4642,35 +5367,17 @@
                                     </p:set>
                                     <p:animEffect transition="in" filter="fade">
                                       <p:cBhvr>
-                                        <p:cTn id="27" dur="500"/>
+                                        <p:cTn id="29" dur="500"/>
                                         <p:tgtEl>
-                                          <p:spTgt spid="23"/>
+                                          <p:spTgt spid="9"/>
                                         </p:tgtEl>
                                       </p:cBhvr>
                                     </p:animEffect>
                                   </p:childTnLst>
                                 </p:cTn>
                               </p:par>
-                            </p:childTnLst>
-                          </p:cTn>
-                        </p:par>
-                      </p:childTnLst>
-                    </p:cTn>
-                  </p:par>
-                  <p:par>
-                    <p:cTn id="28" fill="hold">
-                      <p:stCondLst>
-                        <p:cond delay="indefinite"/>
-                      </p:stCondLst>
-                      <p:childTnLst>
-                        <p:par>
-                          <p:cTn id="29" fill="hold">
-                            <p:stCondLst>
-                              <p:cond delay="0"/>
-                            </p:stCondLst>
-                            <p:childTnLst>
                               <p:par>
-                                <p:cTn id="30" presetID="10" presetClass="entr" presetSubtype="0" fill="hold" nodeType="clickEffect">
+                                <p:cTn id="30" presetID="10" presetClass="entr" presetSubtype="0" fill="hold" grpId="0" nodeType="withEffect">
                                   <p:stCondLst>
                                     <p:cond delay="0"/>
                                   </p:stCondLst>
@@ -4683,7 +5390,7 @@
                                           </p:stCondLst>
                                         </p:cTn>
                                         <p:tgtEl>
-                                          <p:spTgt spid="21"/>
+                                          <p:spTgt spid="46"/>
                                         </p:tgtEl>
                                         <p:attrNameLst>
                                           <p:attrName>style.visibility</p:attrName>
@@ -4697,7 +5404,7 @@
                                       <p:cBhvr>
                                         <p:cTn id="32" dur="500"/>
                                         <p:tgtEl>
-                                          <p:spTgt spid="21"/>
+                                          <p:spTgt spid="46"/>
                                         </p:tgtEl>
                                       </p:cBhvr>
                                     </p:animEffect>
@@ -4718,6 +5425,76 @@
                                           </p:stCondLst>
                                         </p:cTn>
                                         <p:tgtEl>
+                                          <p:spTgt spid="44"/>
+                                        </p:tgtEl>
+                                        <p:attrNameLst>
+                                          <p:attrName>style.visibility</p:attrName>
+                                        </p:attrNameLst>
+                                      </p:cBhvr>
+                                      <p:to>
+                                        <p:strVal val="visible"/>
+                                      </p:to>
+                                    </p:set>
+                                    <p:animEffect transition="in" filter="fade">
+                                      <p:cBhvr>
+                                        <p:cTn id="35" dur="500"/>
+                                        <p:tgtEl>
+                                          <p:spTgt spid="44"/>
+                                        </p:tgtEl>
+                                      </p:cBhvr>
+                                    </p:animEffect>
+                                  </p:childTnLst>
+                                </p:cTn>
+                              </p:par>
+                              <p:par>
+                                <p:cTn id="36" presetID="10" presetClass="entr" presetSubtype="0" fill="hold" nodeType="withEffect">
+                                  <p:stCondLst>
+                                    <p:cond delay="0"/>
+                                  </p:stCondLst>
+                                  <p:childTnLst>
+                                    <p:set>
+                                      <p:cBhvr>
+                                        <p:cTn id="37" dur="1" fill="hold">
+                                          <p:stCondLst>
+                                            <p:cond delay="0"/>
+                                          </p:stCondLst>
+                                        </p:cTn>
+                                        <p:tgtEl>
+                                          <p:spTgt spid="21"/>
+                                        </p:tgtEl>
+                                        <p:attrNameLst>
+                                          <p:attrName>style.visibility</p:attrName>
+                                        </p:attrNameLst>
+                                      </p:cBhvr>
+                                      <p:to>
+                                        <p:strVal val="visible"/>
+                                      </p:to>
+                                    </p:set>
+                                    <p:animEffect transition="in" filter="fade">
+                                      <p:cBhvr>
+                                        <p:cTn id="38" dur="500"/>
+                                        <p:tgtEl>
+                                          <p:spTgt spid="21"/>
+                                        </p:tgtEl>
+                                      </p:cBhvr>
+                                    </p:animEffect>
+                                  </p:childTnLst>
+                                </p:cTn>
+                              </p:par>
+                              <p:par>
+                                <p:cTn id="39" presetID="10" presetClass="entr" presetSubtype="0" fill="hold" grpId="0" nodeType="withEffect">
+                                  <p:stCondLst>
+                                    <p:cond delay="0"/>
+                                  </p:stCondLst>
+                                  <p:childTnLst>
+                                    <p:set>
+                                      <p:cBhvr>
+                                        <p:cTn id="40" dur="1" fill="hold">
+                                          <p:stCondLst>
+                                            <p:cond delay="0"/>
+                                          </p:stCondLst>
+                                        </p:cTn>
+                                        <p:tgtEl>
                                           <p:spTgt spid="26"/>
                                         </p:tgtEl>
                                         <p:attrNameLst>
@@ -4730,7 +5507,7 @@
                                     </p:set>
                                     <p:animEffect transition="in" filter="fade">
                                       <p:cBhvr>
-                                        <p:cTn id="35" dur="500"/>
+                                        <p:cTn id="41" dur="500"/>
                                         <p:tgtEl>
                                           <p:spTgt spid="26"/>
                                         </p:tgtEl>
@@ -4746,26 +5523,26 @@
                     </p:cTn>
                   </p:par>
                   <p:par>
-                    <p:cTn id="36" fill="hold">
+                    <p:cTn id="42" fill="hold">
                       <p:stCondLst>
                         <p:cond delay="indefinite"/>
                       </p:stCondLst>
                       <p:childTnLst>
                         <p:par>
-                          <p:cTn id="37" fill="hold">
+                          <p:cTn id="43" fill="hold">
                             <p:stCondLst>
                               <p:cond delay="0"/>
                             </p:stCondLst>
                             <p:childTnLst>
                               <p:par>
-                                <p:cTn id="38" presetID="10" presetClass="entr" presetSubtype="0" fill="hold" grpId="0" nodeType="clickEffect">
+                                <p:cTn id="44" presetID="10" presetClass="entr" presetSubtype="0" fill="hold" grpId="0" nodeType="clickEffect">
                                   <p:stCondLst>
                                     <p:cond delay="0"/>
                                   </p:stCondLst>
                                   <p:childTnLst>
                                     <p:set>
                                       <p:cBhvr>
-                                        <p:cTn id="39" dur="1" fill="hold">
+                                        <p:cTn id="45" dur="1" fill="hold">
                                           <p:stCondLst>
                                             <p:cond delay="0"/>
                                           </p:stCondLst>
@@ -4783,7 +5560,7 @@
                                     </p:set>
                                     <p:animEffect transition="in" filter="fade">
                                       <p:cBhvr>
-                                        <p:cTn id="40" dur="500"/>
+                                        <p:cTn id="46" dur="500"/>
                                         <p:tgtEl>
                                           <p:spTgt spid="24"/>
                                         </p:tgtEl>
@@ -4792,33 +5569,15 @@
                                   </p:childTnLst>
                                 </p:cTn>
                               </p:par>
-                            </p:childTnLst>
-                          </p:cTn>
-                        </p:par>
-                      </p:childTnLst>
-                    </p:cTn>
-                  </p:par>
-                  <p:par>
-                    <p:cTn id="41" fill="hold">
-                      <p:stCondLst>
-                        <p:cond delay="indefinite"/>
-                      </p:stCondLst>
-                      <p:childTnLst>
-                        <p:par>
-                          <p:cTn id="42" fill="hold">
-                            <p:stCondLst>
-                              <p:cond delay="0"/>
-                            </p:stCondLst>
-                            <p:childTnLst>
                               <p:par>
-                                <p:cTn id="43" presetID="10" presetClass="entr" presetSubtype="0" fill="hold" nodeType="clickEffect">
+                                <p:cTn id="47" presetID="10" presetClass="entr" presetSubtype="0" fill="hold" nodeType="withEffect">
                                   <p:stCondLst>
                                     <p:cond delay="0"/>
                                   </p:stCondLst>
                                   <p:childTnLst>
                                     <p:set>
                                       <p:cBhvr>
-                                        <p:cTn id="44" dur="1" fill="hold">
+                                        <p:cTn id="48" dur="1" fill="hold">
                                           <p:stCondLst>
                                             <p:cond delay="0"/>
                                           </p:stCondLst>
@@ -4836,7 +5595,7 @@
                                     </p:set>
                                     <p:animEffect transition="in" filter="fade">
                                       <p:cBhvr>
-                                        <p:cTn id="45" dur="500"/>
+                                        <p:cTn id="49" dur="500"/>
                                         <p:tgtEl>
                                           <p:spTgt spid="15"/>
                                         </p:tgtEl>
@@ -4846,14 +5605,14 @@
                                 </p:cTn>
                               </p:par>
                               <p:par>
-                                <p:cTn id="46" presetID="10" presetClass="entr" presetSubtype="0" fill="hold" grpId="0" nodeType="withEffect">
+                                <p:cTn id="50" presetID="10" presetClass="entr" presetSubtype="0" fill="hold" grpId="0" nodeType="withEffect">
                                   <p:stCondLst>
                                     <p:cond delay="0"/>
                                   </p:stCondLst>
                                   <p:childTnLst>
                                     <p:set>
                                       <p:cBhvr>
-                                        <p:cTn id="47" dur="1" fill="hold">
+                                        <p:cTn id="51" dur="1" fill="hold">
                                           <p:stCondLst>
                                             <p:cond delay="0"/>
                                           </p:stCondLst>
@@ -4871,7 +5630,7 @@
                                     </p:set>
                                     <p:animEffect transition="in" filter="fade">
                                       <p:cBhvr>
-                                        <p:cTn id="48" dur="500"/>
+                                        <p:cTn id="52" dur="500"/>
                                         <p:tgtEl>
                                           <p:spTgt spid="27"/>
                                         </p:tgtEl>
@@ -4887,79 +5646,26 @@
                     </p:cTn>
                   </p:par>
                   <p:par>
-                    <p:cTn id="49" fill="hold">
+                    <p:cTn id="53" fill="hold">
                       <p:stCondLst>
                         <p:cond delay="indefinite"/>
                       </p:stCondLst>
                       <p:childTnLst>
                         <p:par>
-                          <p:cTn id="50" fill="hold">
+                          <p:cTn id="54" fill="hold">
                             <p:stCondLst>
                               <p:cond delay="0"/>
                             </p:stCondLst>
                             <p:childTnLst>
                               <p:par>
-                                <p:cTn id="51" presetID="10" presetClass="entr" presetSubtype="0" fill="hold" grpId="0" nodeType="clickEffect">
+                                <p:cTn id="55" presetID="10" presetClass="entr" presetSubtype="0" fill="hold" nodeType="clickEffect">
                                   <p:stCondLst>
                                     <p:cond delay="0"/>
                                   </p:stCondLst>
                                   <p:childTnLst>
                                     <p:set>
                                       <p:cBhvr>
-                                        <p:cTn id="52" dur="1" fill="hold">
-                                          <p:stCondLst>
-                                            <p:cond delay="0"/>
-                                          </p:stCondLst>
-                                        </p:cTn>
-                                        <p:tgtEl>
-                                          <p:spTgt spid="25"/>
-                                        </p:tgtEl>
-                                        <p:attrNameLst>
-                                          <p:attrName>style.visibility</p:attrName>
-                                        </p:attrNameLst>
-                                      </p:cBhvr>
-                                      <p:to>
-                                        <p:strVal val="visible"/>
-                                      </p:to>
-                                    </p:set>
-                                    <p:animEffect transition="in" filter="fade">
-                                      <p:cBhvr>
-                                        <p:cTn id="53" dur="500"/>
-                                        <p:tgtEl>
-                                          <p:spTgt spid="25"/>
-                                        </p:tgtEl>
-                                      </p:cBhvr>
-                                    </p:animEffect>
-                                  </p:childTnLst>
-                                </p:cTn>
-                              </p:par>
-                            </p:childTnLst>
-                          </p:cTn>
-                        </p:par>
-                      </p:childTnLst>
-                    </p:cTn>
-                  </p:par>
-                  <p:par>
-                    <p:cTn id="54" fill="hold">
-                      <p:stCondLst>
-                        <p:cond delay="indefinite"/>
-                      </p:stCondLst>
-                      <p:childTnLst>
-                        <p:par>
-                          <p:cTn id="55" fill="hold">
-                            <p:stCondLst>
-                              <p:cond delay="0"/>
-                            </p:stCondLst>
-                            <p:childTnLst>
-                              <p:par>
-                                <p:cTn id="56" presetID="10" presetClass="entr" presetSubtype="0" fill="hold" nodeType="clickEffect">
-                                  <p:stCondLst>
-                                    <p:cond delay="0"/>
-                                  </p:stCondLst>
-                                  <p:childTnLst>
-                                    <p:set>
-                                      <p:cBhvr>
-                                        <p:cTn id="57" dur="1" fill="hold">
+                                        <p:cTn id="56" dur="1" fill="hold">
                                           <p:stCondLst>
                                             <p:cond delay="0"/>
                                           </p:stCondLst>
@@ -4977,7 +5683,7 @@
                                     </p:set>
                                     <p:animEffect transition="in" filter="fade">
                                       <p:cBhvr>
-                                        <p:cTn id="58" dur="500"/>
+                                        <p:cTn id="57" dur="500"/>
                                         <p:tgtEl>
                                           <p:spTgt spid="16"/>
                                         </p:tgtEl>
@@ -4987,14 +5693,49 @@
                                 </p:cTn>
                               </p:par>
                               <p:par>
-                                <p:cTn id="59" presetID="10" presetClass="entr" presetSubtype="0" fill="hold" grpId="0" nodeType="withEffect">
+                                <p:cTn id="58" presetID="10" presetClass="entr" presetSubtype="0" fill="hold" grpId="0" nodeType="withEffect">
                                   <p:stCondLst>
                                     <p:cond delay="0"/>
                                   </p:stCondLst>
                                   <p:childTnLst>
                                     <p:set>
                                       <p:cBhvr>
-                                        <p:cTn id="60" dur="1" fill="hold">
+                                        <p:cTn id="59" dur="1" fill="hold">
+                                          <p:stCondLst>
+                                            <p:cond delay="0"/>
+                                          </p:stCondLst>
+                                        </p:cTn>
+                                        <p:tgtEl>
+                                          <p:spTgt spid="45"/>
+                                        </p:tgtEl>
+                                        <p:attrNameLst>
+                                          <p:attrName>style.visibility</p:attrName>
+                                        </p:attrNameLst>
+                                      </p:cBhvr>
+                                      <p:to>
+                                        <p:strVal val="visible"/>
+                                      </p:to>
+                                    </p:set>
+                                    <p:animEffect transition="in" filter="fade">
+                                      <p:cBhvr>
+                                        <p:cTn id="60" dur="500"/>
+                                        <p:tgtEl>
+                                          <p:spTgt spid="45"/>
+                                        </p:tgtEl>
+                                      </p:cBhvr>
+                                    </p:animEffect>
+                                  </p:childTnLst>
+                                </p:cTn>
+                              </p:par>
+                              <p:par>
+                                <p:cTn id="61" presetID="10" presetClass="entr" presetSubtype="0" fill="hold" grpId="0" nodeType="withEffect">
+                                  <p:stCondLst>
+                                    <p:cond delay="0"/>
+                                  </p:stCondLst>
+                                  <p:childTnLst>
+                                    <p:set>
+                                      <p:cBhvr>
+                                        <p:cTn id="62" dur="1" fill="hold">
                                           <p:stCondLst>
                                             <p:cond delay="0"/>
                                           </p:stCondLst>
@@ -5012,7 +5753,7 @@
                                     </p:set>
                                     <p:animEffect transition="in" filter="fade">
                                       <p:cBhvr>
-                                        <p:cTn id="61" dur="500"/>
+                                        <p:cTn id="63" dur="500"/>
                                         <p:tgtEl>
                                           <p:spTgt spid="30"/>
                                         </p:tgtEl>
@@ -5028,26 +5769,26 @@
                     </p:cTn>
                   </p:par>
                   <p:par>
-                    <p:cTn id="62" fill="hold">
+                    <p:cTn id="64" fill="hold">
                       <p:stCondLst>
                         <p:cond delay="indefinite"/>
                       </p:stCondLst>
                       <p:childTnLst>
                         <p:par>
-                          <p:cTn id="63" fill="hold">
+                          <p:cTn id="65" fill="hold">
                             <p:stCondLst>
                               <p:cond delay="0"/>
                             </p:stCondLst>
                             <p:childTnLst>
                               <p:par>
-                                <p:cTn id="64" presetID="10" presetClass="entr" presetSubtype="0" fill="hold" grpId="0" nodeType="clickEffect">
+                                <p:cTn id="66" presetID="10" presetClass="entr" presetSubtype="0" fill="hold" grpId="0" nodeType="clickEffect">
                                   <p:stCondLst>
                                     <p:cond delay="0"/>
                                   </p:stCondLst>
                                   <p:childTnLst>
                                     <p:set>
                                       <p:cBhvr>
-                                        <p:cTn id="65" dur="1" fill="hold">
+                                        <p:cTn id="67" dur="1" fill="hold">
                                           <p:stCondLst>
                                             <p:cond delay="0"/>
                                           </p:stCondLst>
@@ -5065,7 +5806,7 @@
                                     </p:set>
                                     <p:animEffect transition="in" filter="fade">
                                       <p:cBhvr>
-                                        <p:cTn id="66" dur="500"/>
+                                        <p:cTn id="68" dur="500"/>
                                         <p:tgtEl>
                                           <p:spTgt spid="33"/>
                                         </p:tgtEl>
@@ -5074,26 +5815,8 @@
                                   </p:childTnLst>
                                 </p:cTn>
                               </p:par>
-                            </p:childTnLst>
-                          </p:cTn>
-                        </p:par>
-                      </p:childTnLst>
-                    </p:cTn>
-                  </p:par>
-                  <p:par>
-                    <p:cTn id="67" fill="hold">
-                      <p:stCondLst>
-                        <p:cond delay="indefinite"/>
-                      </p:stCondLst>
-                      <p:childTnLst>
-                        <p:par>
-                          <p:cTn id="68" fill="hold">
-                            <p:stCondLst>
-                              <p:cond delay="0"/>
-                            </p:stCondLst>
-                            <p:childTnLst>
                               <p:par>
-                                <p:cTn id="69" presetID="10" presetClass="entr" presetSubtype="0" fill="hold" grpId="0" nodeType="clickEffect">
+                                <p:cTn id="69" presetID="10" presetClass="entr" presetSubtype="0" fill="hold" grpId="0" nodeType="withEffect">
                                   <p:stCondLst>
                                     <p:cond delay="0"/>
                                   </p:stCondLst>
@@ -5127,6 +5850,41 @@
                                   </p:childTnLst>
                                 </p:cTn>
                               </p:par>
+                              <p:par>
+                                <p:cTn id="72" presetID="10" presetClass="entr" presetSubtype="0" fill="hold" grpId="0" nodeType="withEffect">
+                                  <p:stCondLst>
+                                    <p:cond delay="0"/>
+                                  </p:stCondLst>
+                                  <p:childTnLst>
+                                    <p:set>
+                                      <p:cBhvr>
+                                        <p:cTn id="73" dur="1" fill="hold">
+                                          <p:stCondLst>
+                                            <p:cond delay="0"/>
+                                          </p:stCondLst>
+                                        </p:cTn>
+                                        <p:tgtEl>
+                                          <p:spTgt spid="28"/>
+                                        </p:tgtEl>
+                                        <p:attrNameLst>
+                                          <p:attrName>style.visibility</p:attrName>
+                                        </p:attrNameLst>
+                                      </p:cBhvr>
+                                      <p:to>
+                                        <p:strVal val="visible"/>
+                                      </p:to>
+                                    </p:set>
+                                    <p:animEffect transition="in" filter="fade">
+                                      <p:cBhvr>
+                                        <p:cTn id="74" dur="500"/>
+                                        <p:tgtEl>
+                                          <p:spTgt spid="28"/>
+                                        </p:tgtEl>
+                                      </p:cBhvr>
+                                    </p:animEffect>
+                                  </p:childTnLst>
+                                </p:cTn>
+                              </p:par>
                             </p:childTnLst>
                           </p:cTn>
                         </p:par>
@@ -5134,26 +5892,26 @@
                     </p:cTn>
                   </p:par>
                   <p:par>
-                    <p:cTn id="72" fill="hold">
+                    <p:cTn id="75" fill="hold">
                       <p:stCondLst>
                         <p:cond delay="indefinite"/>
                       </p:stCondLst>
                       <p:childTnLst>
                         <p:par>
-                          <p:cTn id="73" fill="hold">
+                          <p:cTn id="76" fill="hold">
                             <p:stCondLst>
                               <p:cond delay="0"/>
                             </p:stCondLst>
                             <p:childTnLst>
                               <p:par>
-                                <p:cTn id="74" presetID="10" presetClass="entr" presetSubtype="0" fill="hold" grpId="0" nodeType="clickEffect">
+                                <p:cTn id="77" presetID="10" presetClass="entr" presetSubtype="0" fill="hold" grpId="0" nodeType="clickEffect">
                                   <p:stCondLst>
                                     <p:cond delay="0"/>
                                   </p:stCondLst>
                                   <p:childTnLst>
                                     <p:set>
                                       <p:cBhvr>
-                                        <p:cTn id="75" dur="1" fill="hold">
+                                        <p:cTn id="78" dur="1" fill="hold">
                                           <p:stCondLst>
                                             <p:cond delay="0"/>
                                           </p:stCondLst>
@@ -5171,7 +5929,7 @@
                                     </p:set>
                                     <p:animEffect transition="in" filter="fade">
                                       <p:cBhvr>
-                                        <p:cTn id="76" dur="500"/>
+                                        <p:cTn id="79" dur="500"/>
                                         <p:tgtEl>
                                           <p:spTgt spid="37"/>
                                         </p:tgtEl>
@@ -5180,33 +5938,15 @@
                                   </p:childTnLst>
                                 </p:cTn>
                               </p:par>
-                            </p:childTnLst>
-                          </p:cTn>
-                        </p:par>
-                      </p:childTnLst>
-                    </p:cTn>
-                  </p:par>
-                  <p:par>
-                    <p:cTn id="77" fill="hold">
-                      <p:stCondLst>
-                        <p:cond delay="indefinite"/>
-                      </p:stCondLst>
-                      <p:childTnLst>
-                        <p:par>
-                          <p:cTn id="78" fill="hold">
-                            <p:stCondLst>
-                              <p:cond delay="0"/>
-                            </p:stCondLst>
-                            <p:childTnLst>
                               <p:par>
-                                <p:cTn id="79" presetID="10" presetClass="entr" presetSubtype="0" fill="hold" grpId="0" nodeType="clickEffect">
+                                <p:cTn id="80" presetID="10" presetClass="entr" presetSubtype="0" fill="hold" grpId="0" nodeType="withEffect">
                                   <p:stCondLst>
                                     <p:cond delay="0"/>
                                   </p:stCondLst>
                                   <p:childTnLst>
                                     <p:set>
                                       <p:cBhvr>
-                                        <p:cTn id="80" dur="1" fill="hold">
+                                        <p:cTn id="81" dur="1" fill="hold">
                                           <p:stCondLst>
                                             <p:cond delay="0"/>
                                           </p:stCondLst>
@@ -5224,7 +5964,7 @@
                                     </p:set>
                                     <p:animEffect transition="in" filter="fade">
                                       <p:cBhvr>
-                                        <p:cTn id="81" dur="500"/>
+                                        <p:cTn id="82" dur="500"/>
                                         <p:tgtEl>
                                           <p:spTgt spid="35"/>
                                         </p:tgtEl>
@@ -5233,33 +5973,50 @@
                                   </p:childTnLst>
                                 </p:cTn>
                               </p:par>
-                            </p:childTnLst>
-                          </p:cTn>
-                        </p:par>
-                      </p:childTnLst>
-                    </p:cTn>
-                  </p:par>
-                  <p:par>
-                    <p:cTn id="82" fill="hold">
-                      <p:stCondLst>
-                        <p:cond delay="indefinite"/>
-                      </p:stCondLst>
-                      <p:childTnLst>
-                        <p:par>
-                          <p:cTn id="83" fill="hold">
-                            <p:stCondLst>
-                              <p:cond delay="0"/>
-                            </p:stCondLst>
-                            <p:childTnLst>
                               <p:par>
-                                <p:cTn id="84" presetID="10" presetClass="entr" presetSubtype="0" fill="hold" nodeType="clickEffect">
+                                <p:cTn id="83" presetID="10" presetClass="entr" presetSubtype="0" fill="hold" grpId="0" nodeType="withEffect">
                                   <p:stCondLst>
                                     <p:cond delay="0"/>
                                   </p:stCondLst>
                                   <p:childTnLst>
                                     <p:set>
                                       <p:cBhvr>
-                                        <p:cTn id="85" dur="1" fill="hold">
+                                        <p:cTn id="84" dur="1" fill="hold">
+                                          <p:stCondLst>
+                                            <p:cond delay="0"/>
+                                          </p:stCondLst>
+                                        </p:cTn>
+                                        <p:tgtEl>
+                                          <p:spTgt spid="2"/>
+                                        </p:tgtEl>
+                                        <p:attrNameLst>
+                                          <p:attrName>style.visibility</p:attrName>
+                                        </p:attrNameLst>
+                                      </p:cBhvr>
+                                      <p:to>
+                                        <p:strVal val="visible"/>
+                                      </p:to>
+                                    </p:set>
+                                    <p:animEffect transition="in" filter="fade">
+                                      <p:cBhvr>
+                                        <p:cTn id="85" dur="500"/>
+                                        <p:tgtEl>
+                                          <p:spTgt spid="2"/>
+                                        </p:tgtEl>
+                                      </p:cBhvr>
+                                    </p:animEffect>
+                                  </p:childTnLst>
+                                </p:cTn>
+                              </p:par>
+                              <p:par>
+                                <p:cTn id="86" presetID="10" presetClass="entr" presetSubtype="0" fill="hold" nodeType="withEffect">
+                                  <p:stCondLst>
+                                    <p:cond delay="0"/>
+                                  </p:stCondLst>
+                                  <p:childTnLst>
+                                    <p:set>
+                                      <p:cBhvr>
+                                        <p:cTn id="87" dur="1" fill="hold">
                                           <p:stCondLst>
                                             <p:cond delay="0"/>
                                           </p:stCondLst>
@@ -5277,7 +6034,7 @@
                                     </p:set>
                                     <p:animEffect transition="in" filter="fade">
                                       <p:cBhvr>
-                                        <p:cTn id="86" dur="500"/>
+                                        <p:cTn id="88" dur="500"/>
                                         <p:tgtEl>
                                           <p:spTgt spid="32"/>
                                         </p:tgtEl>
@@ -5286,26 +6043,8 @@
                                   </p:childTnLst>
                                 </p:cTn>
                               </p:par>
-                            </p:childTnLst>
-                          </p:cTn>
-                        </p:par>
-                      </p:childTnLst>
-                    </p:cTn>
-                  </p:par>
-                  <p:par>
-                    <p:cTn id="87" fill="hold">
-                      <p:stCondLst>
-                        <p:cond delay="indefinite"/>
-                      </p:stCondLst>
-                      <p:childTnLst>
-                        <p:par>
-                          <p:cTn id="88" fill="hold">
-                            <p:stCondLst>
-                              <p:cond delay="0"/>
-                            </p:stCondLst>
-                            <p:childTnLst>
                               <p:par>
-                                <p:cTn id="89" presetID="10" presetClass="entr" presetSubtype="0" fill="hold" grpId="0" nodeType="clickEffect">
+                                <p:cTn id="89" presetID="10" presetClass="entr" presetSubtype="0" fill="hold" grpId="0" nodeType="withEffect">
                                   <p:stCondLst>
                                     <p:cond delay="0"/>
                                   </p:stCondLst>
@@ -5339,6 +6078,41 @@
                                   </p:childTnLst>
                                 </p:cTn>
                               </p:par>
+                              <p:par>
+                                <p:cTn id="92" presetID="10" presetClass="entr" presetSubtype="0" fill="hold" grpId="0" nodeType="withEffect">
+                                  <p:stCondLst>
+                                    <p:cond delay="0"/>
+                                  </p:stCondLst>
+                                  <p:childTnLst>
+                                    <p:set>
+                                      <p:cBhvr>
+                                        <p:cTn id="93" dur="1" fill="hold">
+                                          <p:stCondLst>
+                                            <p:cond delay="0"/>
+                                          </p:stCondLst>
+                                        </p:cTn>
+                                        <p:tgtEl>
+                                          <p:spTgt spid="11"/>
+                                        </p:tgtEl>
+                                        <p:attrNameLst>
+                                          <p:attrName>style.visibility</p:attrName>
+                                        </p:attrNameLst>
+                                      </p:cBhvr>
+                                      <p:to>
+                                        <p:strVal val="visible"/>
+                                      </p:to>
+                                    </p:set>
+                                    <p:animEffect transition="in" filter="fade">
+                                      <p:cBhvr>
+                                        <p:cTn id="94" dur="500"/>
+                                        <p:tgtEl>
+                                          <p:spTgt spid="11"/>
+                                        </p:tgtEl>
+                                      </p:cBhvr>
+                                    </p:animEffect>
+                                  </p:childTnLst>
+                                </p:cTn>
+                              </p:par>
                             </p:childTnLst>
                           </p:cTn>
                         </p:par>
@@ -5346,26 +6120,26 @@
                     </p:cTn>
                   </p:par>
                   <p:par>
-                    <p:cTn id="92" fill="hold">
+                    <p:cTn id="95" fill="hold">
                       <p:stCondLst>
                         <p:cond delay="indefinite"/>
                       </p:stCondLst>
                       <p:childTnLst>
                         <p:par>
-                          <p:cTn id="93" fill="hold">
+                          <p:cTn id="96" fill="hold">
                             <p:stCondLst>
                               <p:cond delay="0"/>
                             </p:stCondLst>
                             <p:childTnLst>
                               <p:par>
-                                <p:cTn id="94" presetID="10" presetClass="entr" presetSubtype="0" fill="hold" grpId="0" nodeType="clickEffect">
+                                <p:cTn id="97" presetID="10" presetClass="entr" presetSubtype="0" fill="hold" grpId="0" nodeType="clickEffect">
                                   <p:stCondLst>
                                     <p:cond delay="0"/>
                                   </p:stCondLst>
                                   <p:childTnLst>
                                     <p:set>
                                       <p:cBhvr>
-                                        <p:cTn id="95" dur="1" fill="hold">
+                                        <p:cTn id="98" dur="1" fill="hold">
                                           <p:stCondLst>
                                             <p:cond delay="0"/>
                                           </p:stCondLst>
@@ -5383,7 +6157,7 @@
                                     </p:set>
                                     <p:animEffect transition="in" filter="fade">
                                       <p:cBhvr>
-                                        <p:cTn id="96" dur="500"/>
+                                        <p:cTn id="99" dur="500"/>
                                         <p:tgtEl>
                                           <p:spTgt spid="38"/>
                                         </p:tgtEl>
@@ -5399,26 +6173,26 @@
                     </p:cTn>
                   </p:par>
                   <p:par>
-                    <p:cTn id="97" fill="hold">
+                    <p:cTn id="100" fill="hold">
                       <p:stCondLst>
                         <p:cond delay="indefinite"/>
                       </p:stCondLst>
                       <p:childTnLst>
                         <p:par>
-                          <p:cTn id="98" fill="hold">
+                          <p:cTn id="101" fill="hold">
                             <p:stCondLst>
                               <p:cond delay="0"/>
                             </p:stCondLst>
                             <p:childTnLst>
                               <p:par>
-                                <p:cTn id="99" presetID="10" presetClass="entr" presetSubtype="0" fill="hold" nodeType="clickEffect">
+                                <p:cTn id="102" presetID="10" presetClass="entr" presetSubtype="0" fill="hold" nodeType="clickEffect">
                                   <p:stCondLst>
                                     <p:cond delay="0"/>
                                   </p:stCondLst>
                                   <p:childTnLst>
                                     <p:set>
                                       <p:cBhvr>
-                                        <p:cTn id="100" dur="1" fill="hold">
+                                        <p:cTn id="103" dur="1" fill="hold">
                                           <p:stCondLst>
                                             <p:cond delay="0"/>
                                           </p:stCondLst>
@@ -5436,7 +6210,7 @@
                                     </p:set>
                                     <p:animEffect transition="in" filter="fade">
                                       <p:cBhvr>
-                                        <p:cTn id="101" dur="500"/>
+                                        <p:cTn id="104" dur="500"/>
                                         <p:tgtEl>
                                           <p:spTgt spid="36"/>
                                         </p:tgtEl>
@@ -5446,14 +6220,14 @@
                                 </p:cTn>
                               </p:par>
                               <p:par>
-                                <p:cTn id="102" presetID="10" presetClass="entr" presetSubtype="0" fill="hold" grpId="0" nodeType="withEffect">
+                                <p:cTn id="105" presetID="10" presetClass="entr" presetSubtype="0" fill="hold" grpId="0" nodeType="withEffect">
                                   <p:stCondLst>
                                     <p:cond delay="0"/>
                                   </p:stCondLst>
                                   <p:childTnLst>
                                     <p:set>
                                       <p:cBhvr>
-                                        <p:cTn id="103" dur="1" fill="hold">
+                                        <p:cTn id="106" dur="1" fill="hold">
                                           <p:stCondLst>
                                             <p:cond delay="0"/>
                                           </p:stCondLst>
@@ -5471,9 +6245,79 @@
                                     </p:set>
                                     <p:animEffect transition="in" filter="fade">
                                       <p:cBhvr>
-                                        <p:cTn id="104" dur="500"/>
+                                        <p:cTn id="107" dur="500"/>
                                         <p:tgtEl>
                                           <p:spTgt spid="40"/>
+                                        </p:tgtEl>
+                                      </p:cBhvr>
+                                    </p:animEffect>
+                                  </p:childTnLst>
+                                </p:cTn>
+                              </p:par>
+                              <p:par>
+                                <p:cTn id="108" presetID="10" presetClass="entr" presetSubtype="0" fill="hold" grpId="0" nodeType="withEffect">
+                                  <p:stCondLst>
+                                    <p:cond delay="0"/>
+                                  </p:stCondLst>
+                                  <p:childTnLst>
+                                    <p:set>
+                                      <p:cBhvr>
+                                        <p:cTn id="109" dur="1" fill="hold">
+                                          <p:stCondLst>
+                                            <p:cond delay="0"/>
+                                          </p:stCondLst>
+                                        </p:cTn>
+                                        <p:tgtEl>
+                                          <p:spTgt spid="31"/>
+                                        </p:tgtEl>
+                                        <p:attrNameLst>
+                                          <p:attrName>style.visibility</p:attrName>
+                                        </p:attrNameLst>
+                                      </p:cBhvr>
+                                      <p:to>
+                                        <p:strVal val="visible"/>
+                                      </p:to>
+                                    </p:set>
+                                    <p:animEffect transition="in" filter="fade">
+                                      <p:cBhvr>
+                                        <p:cTn id="110" dur="500"/>
+                                        <p:tgtEl>
+                                          <p:spTgt spid="31"/>
+                                        </p:tgtEl>
+                                      </p:cBhvr>
+                                    </p:animEffect>
+                                  </p:childTnLst>
+                                </p:cTn>
+                              </p:par>
+                              <p:par>
+                                <p:cTn id="111" presetID="10" presetClass="entr" presetSubtype="0" fill="hold" nodeType="withEffect">
+                                  <p:stCondLst>
+                                    <p:cond delay="0"/>
+                                  </p:stCondLst>
+                                  <p:childTnLst>
+                                    <p:set>
+                                      <p:cBhvr>
+                                        <p:cTn id="112" dur="1" fill="hold">
+                                          <p:stCondLst>
+                                            <p:cond delay="0"/>
+                                          </p:stCondLst>
+                                        </p:cTn>
+                                        <p:tgtEl>
+                                          <p:spTgt spid="6"/>
+                                        </p:tgtEl>
+                                        <p:attrNameLst>
+                                          <p:attrName>style.visibility</p:attrName>
+                                        </p:attrNameLst>
+                                      </p:cBhvr>
+                                      <p:to>
+                                        <p:strVal val="visible"/>
+                                      </p:to>
+                                    </p:set>
+                                    <p:animEffect transition="in" filter="fade">
+                                      <p:cBhvr>
+                                        <p:cTn id="113" dur="500"/>
+                                        <p:tgtEl>
+                                          <p:spTgt spid="6"/>
                                         </p:tgtEl>
                                       </p:cBhvr>
                                     </p:animEffect>
@@ -5510,9 +6354,7 @@
     <p:bldLst>
       <p:bldP spid="8" grpId="0" animBg="1"/>
       <p:bldP spid="22" grpId="0" animBg="1"/>
-      <p:bldP spid="23" grpId="0" animBg="1"/>
       <p:bldP spid="24" grpId="0" animBg="1"/>
-      <p:bldP spid="25" grpId="0" animBg="1"/>
       <p:bldP spid="26" grpId="0"/>
       <p:bldP spid="27" grpId="0"/>
       <p:bldP spid="30" grpId="0"/>
@@ -5523,6 +6365,16 @@
       <p:bldP spid="38" grpId="0" animBg="1"/>
       <p:bldP spid="39" grpId="0" animBg="1"/>
       <p:bldP spid="40" grpId="0"/>
+      <p:bldP spid="2" grpId="0"/>
+      <p:bldP spid="28" grpId="0"/>
+      <p:bldP spid="31" grpId="0"/>
+      <p:bldP spid="41" grpId="0"/>
+      <p:bldP spid="42" grpId="0"/>
+      <p:bldP spid="9" grpId="0" animBg="1"/>
+      <p:bldP spid="44" grpId="0" animBg="1"/>
+      <p:bldP spid="45" grpId="0" animBg="1"/>
+      <p:bldP spid="46" grpId="0"/>
+      <p:bldP spid="11" grpId="0"/>
     </p:bldLst>
   </p:timing>
 </p:sld>

</xml_diff>